<commit_message>
Edit pptx, pdf reference
</commit_message>
<xml_diff>
--- a/week02/C Study week01~02.pptx
+++ b/week02/C Study week01~02.pptx
@@ -23,7 +23,11 @@
     <p:sldId id="265" r:id="rId17"/>
     <p:sldId id="274" r:id="rId18"/>
     <p:sldId id="275" r:id="rId19"/>
-    <p:sldId id="266" r:id="rId20"/>
+    <p:sldId id="276" r:id="rId20"/>
+    <p:sldId id="278" r:id="rId21"/>
+    <p:sldId id="279" r:id="rId22"/>
+    <p:sldId id="277" r:id="rId23"/>
+    <p:sldId id="266" r:id="rId24"/>
   </p:sldIdLst>
   <p:sldSz cx="12192000" cy="6858000"/>
   <p:notesSz cx="6858000" cy="9144000"/>
@@ -277,7 +281,7 @@
           <a:p>
             <a:fld id="{6A4B53A7-3209-46A6-9454-F38EAC8F11E7}" type="datetimeFigureOut">
               <a:rPr lang="en-US" smtClean="0"/>
-              <a:t>10/23/2021</a:t>
+              <a:t>11/2/2021</a:t>
             </a:fld>
             <a:endParaRPr lang="en-US"/>
           </a:p>
@@ -528,7 +532,7 @@
           <a:p>
             <a:fld id="{6A4B53A7-3209-46A6-9454-F38EAC8F11E7}" type="datetimeFigureOut">
               <a:rPr lang="en-US" smtClean="0"/>
-              <a:t>10/23/2021</a:t>
+              <a:t>11/2/2021</a:t>
             </a:fld>
             <a:endParaRPr lang="en-US"/>
           </a:p>
@@ -789,7 +793,7 @@
           <a:p>
             <a:fld id="{6A4B53A7-3209-46A6-9454-F38EAC8F11E7}" type="datetimeFigureOut">
               <a:rPr lang="en-US" smtClean="0"/>
-              <a:t>10/23/2021</a:t>
+              <a:t>11/2/2021</a:t>
             </a:fld>
             <a:endParaRPr lang="en-US"/>
           </a:p>
@@ -1040,7 +1044,7 @@
           <a:p>
             <a:fld id="{6A4B53A7-3209-46A6-9454-F38EAC8F11E7}" type="datetimeFigureOut">
               <a:rPr lang="en-US" smtClean="0"/>
-              <a:t>10/23/2021</a:t>
+              <a:t>11/2/2021</a:t>
             </a:fld>
             <a:endParaRPr lang="en-US"/>
           </a:p>
@@ -1368,7 +1372,7 @@
           <a:p>
             <a:fld id="{6A4B53A7-3209-46A6-9454-F38EAC8F11E7}" type="datetimeFigureOut">
               <a:rPr lang="en-US" smtClean="0"/>
-              <a:t>10/23/2021</a:t>
+              <a:t>11/2/2021</a:t>
             </a:fld>
             <a:endParaRPr lang="en-US"/>
           </a:p>
@@ -1686,7 +1690,7 @@
           <a:p>
             <a:fld id="{6A4B53A7-3209-46A6-9454-F38EAC8F11E7}" type="datetimeFigureOut">
               <a:rPr lang="en-US" smtClean="0"/>
-              <a:t>10/23/2021</a:t>
+              <a:t>11/2/2021</a:t>
             </a:fld>
             <a:endParaRPr lang="en-US"/>
           </a:p>
@@ -2151,7 +2155,7 @@
           <a:p>
             <a:fld id="{6A4B53A7-3209-46A6-9454-F38EAC8F11E7}" type="datetimeFigureOut">
               <a:rPr lang="en-US" smtClean="0"/>
-              <a:t>10/23/2021</a:t>
+              <a:t>11/2/2021</a:t>
             </a:fld>
             <a:endParaRPr lang="en-US"/>
           </a:p>
@@ -2345,7 +2349,7 @@
           <a:p>
             <a:fld id="{6A4B53A7-3209-46A6-9454-F38EAC8F11E7}" type="datetimeFigureOut">
               <a:rPr lang="en-US" smtClean="0"/>
-              <a:t>10/23/2021</a:t>
+              <a:t>11/2/2021</a:t>
             </a:fld>
             <a:endParaRPr lang="en-US"/>
           </a:p>
@@ -2511,7 +2515,7 @@
           <a:p>
             <a:fld id="{6A4B53A7-3209-46A6-9454-F38EAC8F11E7}" type="datetimeFigureOut">
               <a:rPr lang="en-US" smtClean="0"/>
-              <a:t>10/23/2021</a:t>
+              <a:t>11/2/2021</a:t>
             </a:fld>
             <a:endParaRPr lang="en-US"/>
           </a:p>
@@ -2875,7 +2879,7 @@
           <a:p>
             <a:fld id="{6A4B53A7-3209-46A6-9454-F38EAC8F11E7}" type="datetimeFigureOut">
               <a:rPr lang="en-US" smtClean="0"/>
-              <a:t>10/23/2021</a:t>
+              <a:t>11/2/2021</a:t>
             </a:fld>
             <a:endParaRPr lang="en-US"/>
           </a:p>
@@ -3219,7 +3223,7 @@
           <a:p>
             <a:fld id="{6A4B53A7-3209-46A6-9454-F38EAC8F11E7}" type="datetimeFigureOut">
               <a:rPr lang="en-US" smtClean="0"/>
-              <a:t>10/23/2021</a:t>
+              <a:t>11/2/2021</a:t>
             </a:fld>
             <a:endParaRPr lang="en-US"/>
           </a:p>
@@ -3510,7 +3514,7 @@
             <a:fld id="{6A4B53A7-3209-46A6-9454-F38EAC8F11E7}" type="datetimeFigureOut">
               <a:rPr lang="en-US" smtClean="0"/>
               <a:pPr/>
-              <a:t>10/23/2021</a:t>
+              <a:t>11/2/2021</a:t>
             </a:fld>
             <a:endParaRPr lang="en-US" dirty="0"/>
           </a:p>
@@ -4934,7 +4938,7 @@
                   <a:srgbClr val="FFFFFF"/>
                 </a:solidFill>
               </a:rPr>
-              <a:t>Week 01 </a:t>
+              <a:t>Week 02 </a:t>
             </a:r>
             <a:r>
               <a:rPr lang="en-US" altLang="ko-KR" sz="1400" dirty="0">
@@ -4942,7 +4946,7 @@
                   <a:srgbClr val="FFFFFF"/>
                 </a:solidFill>
               </a:rPr>
-              <a:t>21.10.29. 07:00 PM</a:t>
+              <a:t>21.11.02. 07:00 PM</a:t>
             </a:r>
             <a:endParaRPr lang="ko-KR" altLang="en-US" sz="4000" dirty="0">
               <a:solidFill>
@@ -4966,7 +4970,7 @@
 </file>
 
 <file path=ppt/slides/slide10.xml><?xml version="1.0" encoding="utf-8"?>
-<p:sld xmlns:a="http://schemas.openxmlformats.org/drawingml/2006/main" xmlns:r="http://schemas.openxmlformats.org/officeDocument/2006/relationships" xmlns:p="http://schemas.openxmlformats.org/presentationml/2006/main">
+<p:sld xmlns:a="http://schemas.openxmlformats.org/drawingml/2006/main" xmlns:r="http://schemas.openxmlformats.org/officeDocument/2006/relationships" xmlns:p="http://schemas.openxmlformats.org/presentationml/2006/main" show="0">
   <p:cSld>
     <p:spTree>
       <p:nvGrpSpPr>
@@ -5185,7 +5189,7 @@
 </file>
 
 <file path=ppt/slides/slide11.xml><?xml version="1.0" encoding="utf-8"?>
-<p:sld xmlns:a="http://schemas.openxmlformats.org/drawingml/2006/main" xmlns:r="http://schemas.openxmlformats.org/officeDocument/2006/relationships" xmlns:p="http://schemas.openxmlformats.org/presentationml/2006/main">
+<p:sld xmlns:a="http://schemas.openxmlformats.org/drawingml/2006/main" xmlns:r="http://schemas.openxmlformats.org/officeDocument/2006/relationships" xmlns:p="http://schemas.openxmlformats.org/presentationml/2006/main" show="0">
   <p:cSld>
     <p:spTree>
       <p:nvGrpSpPr>
@@ -5434,7 +5438,7 @@
 </file>
 
 <file path=ppt/slides/slide12.xml><?xml version="1.0" encoding="utf-8"?>
-<p:sld xmlns:a="http://schemas.openxmlformats.org/drawingml/2006/main" xmlns:r="http://schemas.openxmlformats.org/officeDocument/2006/relationships" xmlns:p="http://schemas.openxmlformats.org/presentationml/2006/main">
+<p:sld xmlns:a="http://schemas.openxmlformats.org/drawingml/2006/main" xmlns:r="http://schemas.openxmlformats.org/officeDocument/2006/relationships" xmlns:p="http://schemas.openxmlformats.org/presentationml/2006/main" show="0">
   <p:cSld>
     <p:spTree>
       <p:nvGrpSpPr>
@@ -5683,7 +5687,7 @@
 </file>
 
 <file path=ppt/slides/slide13.xml><?xml version="1.0" encoding="utf-8"?>
-<p:sld xmlns:a="http://schemas.openxmlformats.org/drawingml/2006/main" xmlns:r="http://schemas.openxmlformats.org/officeDocument/2006/relationships" xmlns:p="http://schemas.openxmlformats.org/presentationml/2006/main">
+<p:sld xmlns:a="http://schemas.openxmlformats.org/drawingml/2006/main" xmlns:r="http://schemas.openxmlformats.org/officeDocument/2006/relationships" xmlns:p="http://schemas.openxmlformats.org/presentationml/2006/main" show="0">
   <p:cSld>
     <p:spTree>
       <p:nvGrpSpPr>
@@ -5902,7 +5906,7 @@
 </file>
 
 <file path=ppt/slides/slide14.xml><?xml version="1.0" encoding="utf-8"?>
-<p:sld xmlns:a="http://schemas.openxmlformats.org/drawingml/2006/main" xmlns:r="http://schemas.openxmlformats.org/officeDocument/2006/relationships" xmlns:p="http://schemas.openxmlformats.org/presentationml/2006/main">
+<p:sld xmlns:a="http://schemas.openxmlformats.org/drawingml/2006/main" xmlns:r="http://schemas.openxmlformats.org/officeDocument/2006/relationships" xmlns:p="http://schemas.openxmlformats.org/presentationml/2006/main" show="0">
   <p:cSld>
     <p:spTree>
       <p:nvGrpSpPr>
@@ -7069,7 +7073,7 @@
         </p:nvSpPr>
         <p:spPr>
           <a:xfrm>
-            <a:off x="168534" y="-105410"/>
+            <a:off x="8877" y="-270052"/>
             <a:ext cx="9430958" cy="1167841"/>
           </a:xfrm>
         </p:spPr>
@@ -7080,7 +7084,7 @@
           <a:lstStyle/>
           <a:p>
             <a:r>
-              <a:rPr lang="en-US" altLang="ko-KR" sz="5400" dirty="0">
+              <a:rPr lang="en-US" altLang="ko-KR" sz="4800" dirty="0">
                 <a:solidFill>
                   <a:schemeClr val="tx1">
                     <a:lumMod val="75000"/>
@@ -7090,9 +7094,9 @@
                 <a:latin typeface="08서울남산체 EB" panose="02020603020101020101" pitchFamily="18" charset="-127"/>
                 <a:ea typeface="08서울남산체 EB" panose="02020603020101020101" pitchFamily="18" charset="-127"/>
               </a:rPr>
-              <a:t>Assignment</a:t>
-            </a:r>
-            <a:endParaRPr lang="ko-KR" altLang="en-US" sz="5400" dirty="0">
+              <a:t>Array Basic (01)</a:t>
+            </a:r>
+            <a:endParaRPr lang="ko-KR" altLang="en-US" sz="4800" dirty="0">
               <a:solidFill>
                 <a:schemeClr val="tx1">
                   <a:lumMod val="75000"/>
@@ -7107,926 +7111,117 @@
       </p:sp>
       <p:sp>
         <p:nvSpPr>
-          <p:cNvPr id="6" name="부제목 2">
-            <a:extLst>
-              <a:ext uri="{FF2B5EF4-FFF2-40B4-BE49-F238E27FC236}">
-                <a16:creationId xmlns:a16="http://schemas.microsoft.com/office/drawing/2014/main" id="{CD7C2ABE-3ECC-4B23-A809-B01C9C72A61D}"/>
-              </a:ext>
-            </a:extLst>
-          </p:cNvPr>
-          <p:cNvSpPr>
-            <a:spLocks noGrp="1"/>
+          <p:cNvPr id="6" name="제목 1">
+            <a:extLst>
+              <a:ext uri="{FF2B5EF4-FFF2-40B4-BE49-F238E27FC236}">
+                <a16:creationId xmlns:a16="http://schemas.microsoft.com/office/drawing/2014/main" id="{9F4EC6B0-B381-4838-A787-D6F8E36BDC5A}"/>
+              </a:ext>
+            </a:extLst>
+          </p:cNvPr>
+          <p:cNvSpPr txBox="1">
+            <a:spLocks/>
           </p:cNvSpPr>
-          <p:nvPr>
-            <p:ph type="subTitle" idx="1"/>
-          </p:nvPr>
-        </p:nvSpPr>
-        <p:spPr>
-          <a:xfrm>
-            <a:off x="766610" y="1217104"/>
-            <a:ext cx="10838202" cy="4560607"/>
-          </a:xfrm>
-        </p:spPr>
-        <p:txBody>
-          <a:bodyPr anchor="ctr">
-            <a:normAutofit fontScale="70000" lnSpcReduction="20000"/>
+          <p:nvPr/>
+        </p:nvSpPr>
+        <p:spPr>
+          <a:xfrm>
+            <a:off x="-46395" y="-281086"/>
+            <a:ext cx="9430958" cy="1167841"/>
+          </a:xfrm>
+          <a:prstGeom prst="rect">
+            <a:avLst/>
+          </a:prstGeom>
+        </p:spPr>
+        <p:txBody>
+          <a:bodyPr lIns="109728" tIns="109728" rIns="109728" bIns="91440" anchor="b">
+            <a:normAutofit/>
           </a:bodyPr>
-          <a:lstStyle/>
-          <a:p>
-            <a:r>
-              <a:rPr lang="en-US" altLang="ko-KR" sz="3600" dirty="0">
-                <a:effectLst>
-                  <a:outerShdw blurRad="38100" dist="38100" dir="2700000" algn="tl">
-                    <a:srgbClr val="000000">
-                      <a:alpha val="43137"/>
-                    </a:srgbClr>
-                  </a:outerShdw>
-                </a:effectLst>
-              </a:rPr>
-              <a:t>Q. Palindrome(</a:t>
-            </a:r>
-            <a:r>
-              <a:rPr lang="ko-KR" altLang="en-US" sz="3600" dirty="0">
-                <a:effectLst>
-                  <a:outerShdw blurRad="38100" dist="38100" dir="2700000" algn="tl">
-                    <a:srgbClr val="000000">
-                      <a:alpha val="43137"/>
-                    </a:srgbClr>
-                  </a:outerShdw>
-                </a:effectLst>
-              </a:rPr>
-              <a:t>회문</a:t>
-            </a:r>
-            <a:r>
-              <a:rPr lang="en-US" altLang="ko-KR" sz="3600" dirty="0">
-                <a:effectLst>
-                  <a:outerShdw blurRad="38100" dist="38100" dir="2700000" algn="tl">
-                    <a:srgbClr val="000000">
-                      <a:alpha val="43137"/>
-                    </a:srgbClr>
-                  </a:outerShdw>
-                </a:effectLst>
-              </a:rPr>
-              <a:t>)</a:t>
-            </a:r>
-            <a:r>
-              <a:rPr lang="ko-KR" altLang="en-US" sz="3600" dirty="0">
-                <a:effectLst>
-                  <a:outerShdw blurRad="38100" dist="38100" dir="2700000" algn="tl">
-                    <a:srgbClr val="000000">
-                      <a:alpha val="43137"/>
-                    </a:srgbClr>
-                  </a:outerShdw>
-                </a:effectLst>
-              </a:rPr>
-              <a:t>여부를 검출</a:t>
-            </a:r>
-            <a:endParaRPr lang="en-US" altLang="ko-KR" sz="3600" dirty="0">
-              <a:effectLst>
-                <a:outerShdw blurRad="38100" dist="38100" dir="2700000" algn="tl">
-                  <a:srgbClr val="000000">
-                    <a:alpha val="43137"/>
-                  </a:srgbClr>
-                </a:outerShdw>
-              </a:effectLst>
-            </a:endParaRPr>
-          </a:p>
-          <a:p>
-            <a:r>
-              <a:rPr lang="en-US" altLang="ko-KR" sz="1500" dirty="0">
-                <a:effectLst>
-                  <a:outerShdw blurRad="38100" dist="38100" dir="2700000" algn="tl">
-                    <a:srgbClr val="000000">
-                      <a:alpha val="43137"/>
-                    </a:srgbClr>
-                  </a:outerShdw>
-                </a:effectLst>
-              </a:rPr>
-              <a:t>Palindrome</a:t>
-            </a:r>
-            <a:r>
-              <a:rPr lang="ko-KR" altLang="en-US" sz="1500" dirty="0">
-                <a:effectLst>
-                  <a:outerShdw blurRad="38100" dist="38100" dir="2700000" algn="tl">
-                    <a:srgbClr val="000000">
-                      <a:alpha val="43137"/>
-                    </a:srgbClr>
-                  </a:outerShdw>
-                </a:effectLst>
-              </a:rPr>
-              <a:t>은 회문이라 불리며 정방향에서 읽는 것과 역방향에서 읽는 것이 동일한 낱말</a:t>
-            </a:r>
-            <a:r>
-              <a:rPr lang="en-US" altLang="ko-KR" sz="1500" dirty="0">
-                <a:effectLst>
-                  <a:outerShdw blurRad="38100" dist="38100" dir="2700000" algn="tl">
-                    <a:srgbClr val="000000">
-                      <a:alpha val="43137"/>
-                    </a:srgbClr>
-                  </a:outerShdw>
-                </a:effectLst>
-              </a:rPr>
-              <a:t>, </a:t>
-            </a:r>
-            <a:r>
-              <a:rPr lang="ko-KR" altLang="en-US" sz="1500" dirty="0">
-                <a:effectLst>
-                  <a:outerShdw blurRad="38100" dist="38100" dir="2700000" algn="tl">
-                    <a:srgbClr val="000000">
-                      <a:alpha val="43137"/>
-                    </a:srgbClr>
-                  </a:outerShdw>
-                </a:effectLst>
-              </a:rPr>
-              <a:t>숫자</a:t>
-            </a:r>
-            <a:r>
-              <a:rPr lang="en-US" altLang="ko-KR" sz="1500" dirty="0">
-                <a:effectLst>
-                  <a:outerShdw blurRad="38100" dist="38100" dir="2700000" algn="tl">
-                    <a:srgbClr val="000000">
-                      <a:alpha val="43137"/>
-                    </a:srgbClr>
-                  </a:outerShdw>
-                </a:effectLst>
-              </a:rPr>
-              <a:t>, </a:t>
-            </a:r>
-            <a:r>
-              <a:rPr lang="ko-KR" altLang="en-US" sz="1500" dirty="0">
-                <a:effectLst>
-                  <a:outerShdw blurRad="38100" dist="38100" dir="2700000" algn="tl">
-                    <a:srgbClr val="000000">
-                      <a:alpha val="43137"/>
-                    </a:srgbClr>
-                  </a:outerShdw>
-                </a:effectLst>
-              </a:rPr>
-              <a:t>문자열을 뜻한다</a:t>
-            </a:r>
-            <a:r>
-              <a:rPr lang="en-US" altLang="ko-KR" sz="1500" dirty="0">
-                <a:effectLst>
-                  <a:outerShdw blurRad="38100" dist="38100" dir="2700000" algn="tl">
-                    <a:srgbClr val="000000">
-                      <a:alpha val="43137"/>
-                    </a:srgbClr>
-                  </a:outerShdw>
-                </a:effectLst>
-              </a:rPr>
-              <a:t>. </a:t>
-            </a:r>
-          </a:p>
-          <a:p>
-            <a:r>
-              <a:rPr lang="ko-KR" altLang="en-US" sz="1500" dirty="0">
-                <a:effectLst>
-                  <a:outerShdw blurRad="38100" dist="38100" dir="2700000" algn="tl">
-                    <a:srgbClr val="000000">
-                      <a:alpha val="43137"/>
-                    </a:srgbClr>
-                  </a:outerShdw>
-                </a:effectLst>
-              </a:rPr>
-              <a:t>검출하기 위해 사용되는 낱말</a:t>
-            </a:r>
-            <a:r>
-              <a:rPr lang="en-US" altLang="ko-KR" sz="1500" dirty="0">
-                <a:effectLst>
-                  <a:outerShdw blurRad="38100" dist="38100" dir="2700000" algn="tl">
-                    <a:srgbClr val="000000">
-                      <a:alpha val="43137"/>
-                    </a:srgbClr>
-                  </a:outerShdw>
-                </a:effectLst>
-              </a:rPr>
-              <a:t>, </a:t>
-            </a:r>
-            <a:r>
-              <a:rPr lang="ko-KR" altLang="en-US" sz="1500" dirty="0">
-                <a:effectLst>
-                  <a:outerShdw blurRad="38100" dist="38100" dir="2700000" algn="tl">
-                    <a:srgbClr val="000000">
-                      <a:alpha val="43137"/>
-                    </a:srgbClr>
-                  </a:outerShdw>
-                </a:effectLst>
-              </a:rPr>
-              <a:t>숫자</a:t>
-            </a:r>
-            <a:r>
-              <a:rPr lang="en-US" altLang="ko-KR" sz="1500" dirty="0">
-                <a:effectLst>
-                  <a:outerShdw blurRad="38100" dist="38100" dir="2700000" algn="tl">
-                    <a:srgbClr val="000000">
-                      <a:alpha val="43137"/>
-                    </a:srgbClr>
-                  </a:outerShdw>
-                </a:effectLst>
-              </a:rPr>
-              <a:t>, </a:t>
-            </a:r>
-            <a:r>
-              <a:rPr lang="ko-KR" altLang="en-US" sz="1500" dirty="0">
-                <a:effectLst>
-                  <a:outerShdw blurRad="38100" dist="38100" dir="2700000" algn="tl">
-                    <a:srgbClr val="000000">
-                      <a:alpha val="43137"/>
-                    </a:srgbClr>
-                  </a:outerShdw>
-                </a:effectLst>
-              </a:rPr>
-              <a:t>문자열의 모음을 </a:t>
-            </a:r>
-            <a:r>
-              <a:rPr lang="en-US" altLang="ko-KR" sz="1500" dirty="0">
-                <a:effectLst>
-                  <a:outerShdw blurRad="38100" dist="38100" dir="2700000" algn="tl">
-                    <a:srgbClr val="000000">
-                      <a:alpha val="43137"/>
-                    </a:srgbClr>
-                  </a:outerShdw>
-                </a:effectLst>
-              </a:rPr>
-              <a:t>‘</a:t>
-            </a:r>
-            <a:r>
-              <a:rPr lang="ko-KR" altLang="en-US" sz="1500" dirty="0">
-                <a:effectLst>
-                  <a:outerShdw blurRad="38100" dist="38100" dir="2700000" algn="tl">
-                    <a:srgbClr val="000000">
-                      <a:alpha val="43137"/>
-                    </a:srgbClr>
-                  </a:outerShdw>
-                </a:effectLst>
-              </a:rPr>
-              <a:t>구문</a:t>
-            </a:r>
-            <a:r>
-              <a:rPr lang="en-US" altLang="ko-KR" sz="1500" dirty="0">
-                <a:effectLst>
-                  <a:outerShdw blurRad="38100" dist="38100" dir="2700000" algn="tl">
-                    <a:srgbClr val="000000">
-                      <a:alpha val="43137"/>
-                    </a:srgbClr>
-                  </a:outerShdw>
-                </a:effectLst>
-              </a:rPr>
-              <a:t>＇</a:t>
-            </a:r>
-            <a:r>
-              <a:rPr lang="ko-KR" altLang="en-US" sz="1500" dirty="0">
-                <a:effectLst>
-                  <a:outerShdw blurRad="38100" dist="38100" dir="2700000" algn="tl">
-                    <a:srgbClr val="000000">
-                      <a:alpha val="43137"/>
-                    </a:srgbClr>
-                  </a:outerShdw>
-                </a:effectLst>
-              </a:rPr>
-              <a:t>이라고 칭하고 </a:t>
-            </a:r>
-            <a:endParaRPr lang="en-US" altLang="ko-KR" sz="1500" dirty="0">
-              <a:effectLst>
-                <a:outerShdw blurRad="38100" dist="38100" dir="2700000" algn="tl">
-                  <a:srgbClr val="000000">
-                    <a:alpha val="43137"/>
-                  </a:srgbClr>
-                </a:outerShdw>
-              </a:effectLst>
-            </a:endParaRPr>
-          </a:p>
-          <a:p>
-            <a:r>
-              <a:rPr lang="ko-KR" altLang="en-US" sz="1500" dirty="0">
-                <a:effectLst>
-                  <a:outerShdw blurRad="38100" dist="38100" dir="2700000" algn="tl">
-                    <a:srgbClr val="000000">
-                      <a:alpha val="43137"/>
-                    </a:srgbClr>
-                  </a:outerShdw>
-                </a:effectLst>
-              </a:rPr>
-              <a:t>구문사이에 속해 있는 띄어쓰기나 특수문자</a:t>
-            </a:r>
-            <a:r>
-              <a:rPr lang="en-US" altLang="ko-KR" sz="1500" dirty="0">
-                <a:effectLst>
-                  <a:outerShdw blurRad="38100" dist="38100" dir="2700000" algn="tl">
-                    <a:srgbClr val="000000">
-                      <a:alpha val="43137"/>
-                    </a:srgbClr>
-                  </a:outerShdw>
-                </a:effectLst>
-              </a:rPr>
-              <a:t>, </a:t>
-            </a:r>
-            <a:r>
-              <a:rPr lang="ko-KR" altLang="en-US" sz="1500" dirty="0">
-                <a:effectLst>
-                  <a:outerShdw blurRad="38100" dist="38100" dir="2700000" algn="tl">
-                    <a:srgbClr val="000000">
-                      <a:alpha val="43137"/>
-                    </a:srgbClr>
-                  </a:outerShdw>
-                </a:effectLst>
-              </a:rPr>
-              <a:t>문장부호는 무시한다</a:t>
-            </a:r>
-            <a:r>
-              <a:rPr lang="en-US" altLang="ko-KR" sz="1500" dirty="0">
-                <a:effectLst>
-                  <a:outerShdw blurRad="38100" dist="38100" dir="2700000" algn="tl">
-                    <a:srgbClr val="000000">
-                      <a:alpha val="43137"/>
-                    </a:srgbClr>
-                  </a:outerShdw>
-                </a:effectLst>
-              </a:rPr>
-              <a:t>. </a:t>
-            </a:r>
-          </a:p>
-          <a:p>
-            <a:r>
-              <a:rPr lang="ko-KR" altLang="en-US" sz="1500" dirty="0">
-                <a:effectLst>
-                  <a:outerShdw blurRad="38100" dist="38100" dir="2700000" algn="tl">
-                    <a:srgbClr val="000000">
-                      <a:alpha val="43137"/>
-                    </a:srgbClr>
-                  </a:outerShdw>
-                </a:effectLst>
-              </a:rPr>
-              <a:t>하나의 문자열을 입력 받아서 그 문자열이 회문인지 아닌지 검출하는 프로그램을 </a:t>
-            </a:r>
-            <a:r>
-              <a:rPr lang="ko-KR" altLang="en-US" sz="1500" dirty="0" err="1">
-                <a:effectLst>
-                  <a:outerShdw blurRad="38100" dist="38100" dir="2700000" algn="tl">
-                    <a:srgbClr val="000000">
-                      <a:alpha val="43137"/>
-                    </a:srgbClr>
-                  </a:outerShdw>
-                </a:effectLst>
-              </a:rPr>
-              <a:t>작성하시오</a:t>
-            </a:r>
-            <a:r>
-              <a:rPr lang="en-US" altLang="ko-KR" sz="1500" dirty="0">
-                <a:effectLst>
-                  <a:outerShdw blurRad="38100" dist="38100" dir="2700000" algn="tl">
-                    <a:srgbClr val="000000">
-                      <a:alpha val="43137"/>
-                    </a:srgbClr>
-                  </a:outerShdw>
-                </a:effectLst>
-              </a:rPr>
-              <a:t>.</a:t>
-            </a:r>
-          </a:p>
-          <a:p>
-            <a:r>
-              <a:rPr lang="en-US" altLang="ko-KR" sz="1500" dirty="0">
-                <a:effectLst>
-                  <a:outerShdw blurRad="38100" dist="38100" dir="2700000" algn="tl">
-                    <a:srgbClr val="000000">
-                      <a:alpha val="43137"/>
-                    </a:srgbClr>
-                  </a:outerShdw>
-                </a:effectLst>
-              </a:rPr>
-              <a:t>(</a:t>
-            </a:r>
-            <a:r>
-              <a:rPr lang="ko-KR" altLang="en-US" sz="1500" dirty="0">
-                <a:effectLst>
-                  <a:outerShdw blurRad="38100" dist="38100" dir="2700000" algn="tl">
-                    <a:srgbClr val="000000">
-                      <a:alpha val="43137"/>
-                    </a:srgbClr>
-                  </a:outerShdw>
-                </a:effectLst>
-              </a:rPr>
-              <a:t>단</a:t>
-            </a:r>
-            <a:r>
-              <a:rPr lang="en-US" altLang="ko-KR" sz="1500" dirty="0">
-                <a:effectLst>
-                  <a:outerShdw blurRad="38100" dist="38100" dir="2700000" algn="tl">
-                    <a:srgbClr val="000000">
-                      <a:alpha val="43137"/>
-                    </a:srgbClr>
-                  </a:outerShdw>
-                </a:effectLst>
-              </a:rPr>
-              <a:t>, </a:t>
-            </a:r>
-            <a:r>
-              <a:rPr lang="ko-KR" altLang="en-US" sz="1500" dirty="0">
-                <a:effectLst>
-                  <a:outerShdw blurRad="38100" dist="38100" dir="2700000" algn="tl">
-                    <a:srgbClr val="000000">
-                      <a:alpha val="43137"/>
-                    </a:srgbClr>
-                  </a:outerShdw>
-                </a:effectLst>
-              </a:rPr>
-              <a:t>문자열 입력 시</a:t>
-            </a:r>
-            <a:r>
-              <a:rPr lang="en-US" altLang="ko-KR" sz="1500" dirty="0">
-                <a:effectLst>
-                  <a:outerShdw blurRad="38100" dist="38100" dir="2700000" algn="tl">
-                    <a:srgbClr val="000000">
-                      <a:alpha val="43137"/>
-                    </a:srgbClr>
-                  </a:outerShdw>
-                </a:effectLst>
-              </a:rPr>
-              <a:t>, </a:t>
-            </a:r>
-            <a:r>
-              <a:rPr lang="ko-KR" altLang="en-US" sz="1500" dirty="0">
-                <a:effectLst>
-                  <a:outerShdw blurRad="38100" dist="38100" dir="2700000" algn="tl">
-                    <a:srgbClr val="000000">
-                      <a:alpha val="43137"/>
-                    </a:srgbClr>
-                  </a:outerShdw>
-                </a:effectLst>
-              </a:rPr>
-              <a:t>소문자로 된 알파벳 </a:t>
-            </a:r>
-            <a:r>
-              <a:rPr lang="en-US" altLang="ko-KR" sz="1500" dirty="0" err="1">
-                <a:effectLst>
-                  <a:outerShdw blurRad="38100" dist="38100" dir="2700000" algn="tl">
-                    <a:srgbClr val="000000">
-                      <a:alpha val="43137"/>
-                    </a:srgbClr>
-                  </a:outerShdw>
-                </a:effectLst>
-              </a:rPr>
-              <a:t>a~z</a:t>
-            </a:r>
-            <a:r>
-              <a:rPr lang="ko-KR" altLang="en-US" sz="1500" dirty="0">
-                <a:effectLst>
-                  <a:outerShdw blurRad="38100" dist="38100" dir="2700000" algn="tl">
-                    <a:srgbClr val="000000">
-                      <a:alpha val="43137"/>
-                    </a:srgbClr>
-                  </a:outerShdw>
-                </a:effectLst>
-              </a:rPr>
-              <a:t>로만 이루어진 </a:t>
-            </a:r>
-            <a:r>
-              <a:rPr lang="en-US" altLang="ko-KR" sz="1500" dirty="0">
-                <a:effectLst>
-                  <a:outerShdw blurRad="38100" dist="38100" dir="2700000" algn="tl">
-                    <a:srgbClr val="000000">
-                      <a:alpha val="43137"/>
-                    </a:srgbClr>
-                  </a:outerShdw>
-                </a:effectLst>
-              </a:rPr>
-              <a:t>7</a:t>
-            </a:r>
-            <a:r>
-              <a:rPr lang="ko-KR" altLang="en-US" sz="1500" dirty="0">
-                <a:effectLst>
-                  <a:outerShdw blurRad="38100" dist="38100" dir="2700000" algn="tl">
-                    <a:srgbClr val="000000">
-                      <a:alpha val="43137"/>
-                    </a:srgbClr>
-                  </a:outerShdw>
-                </a:effectLst>
-              </a:rPr>
-              <a:t>자의 문자열이 입력되며</a:t>
-            </a:r>
-            <a:r>
-              <a:rPr lang="en-US" altLang="ko-KR" sz="1500" dirty="0">
-                <a:effectLst>
-                  <a:outerShdw blurRad="38100" dist="38100" dir="2700000" algn="tl">
-                    <a:srgbClr val="000000">
-                      <a:alpha val="43137"/>
-                    </a:srgbClr>
-                  </a:outerShdw>
-                </a:effectLst>
-              </a:rPr>
-              <a:t>, </a:t>
-            </a:r>
-          </a:p>
-          <a:p>
-            <a:r>
-              <a:rPr lang="ko-KR" altLang="en-US" sz="1500" dirty="0">
-                <a:effectLst>
-                  <a:outerShdw blurRad="38100" dist="38100" dir="2700000" algn="tl">
-                    <a:srgbClr val="000000">
-                      <a:alpha val="43137"/>
-                    </a:srgbClr>
-                  </a:outerShdw>
-                </a:effectLst>
-              </a:rPr>
-              <a:t>공백과 띄어쓰기</a:t>
-            </a:r>
-            <a:r>
-              <a:rPr lang="en-US" altLang="ko-KR" sz="1500" dirty="0">
-                <a:effectLst>
-                  <a:outerShdw blurRad="38100" dist="38100" dir="2700000" algn="tl">
-                    <a:srgbClr val="000000">
-                      <a:alpha val="43137"/>
-                    </a:srgbClr>
-                  </a:outerShdw>
-                </a:effectLst>
-              </a:rPr>
-              <a:t>, </a:t>
-            </a:r>
-            <a:r>
-              <a:rPr lang="ko-KR" altLang="en-US" sz="1500" dirty="0">
-                <a:effectLst>
-                  <a:outerShdw blurRad="38100" dist="38100" dir="2700000" algn="tl">
-                    <a:srgbClr val="000000">
-                      <a:alpha val="43137"/>
-                    </a:srgbClr>
-                  </a:outerShdw>
-                </a:effectLst>
-              </a:rPr>
-              <a:t>특수문자</a:t>
-            </a:r>
-            <a:r>
-              <a:rPr lang="en-US" altLang="ko-KR" sz="1500" dirty="0">
-                <a:effectLst>
-                  <a:outerShdw blurRad="38100" dist="38100" dir="2700000" algn="tl">
-                    <a:srgbClr val="000000">
-                      <a:alpha val="43137"/>
-                    </a:srgbClr>
-                  </a:outerShdw>
-                </a:effectLst>
-              </a:rPr>
-              <a:t>, </a:t>
-            </a:r>
-            <a:r>
-              <a:rPr lang="ko-KR" altLang="en-US" sz="1500" dirty="0">
-                <a:effectLst>
-                  <a:outerShdw blurRad="38100" dist="38100" dir="2700000" algn="tl">
-                    <a:srgbClr val="000000">
-                      <a:alpha val="43137"/>
-                    </a:srgbClr>
-                  </a:outerShdw>
-                </a:effectLst>
-              </a:rPr>
-              <a:t>문장부호는 고려하지 않도록 한다</a:t>
-            </a:r>
-            <a:r>
-              <a:rPr lang="en-US" altLang="ko-KR" sz="1500" dirty="0">
-                <a:effectLst>
-                  <a:outerShdw blurRad="38100" dist="38100" dir="2700000" algn="tl">
-                    <a:srgbClr val="000000">
-                      <a:alpha val="43137"/>
-                    </a:srgbClr>
-                  </a:outerShdw>
-                </a:effectLst>
-              </a:rPr>
-              <a:t>.)</a:t>
-            </a:r>
-            <a:r>
-              <a:rPr lang="ko-KR" altLang="en-US" sz="1500" dirty="0">
-                <a:effectLst>
-                  <a:outerShdw blurRad="38100" dist="38100" dir="2700000" algn="tl">
-                    <a:srgbClr val="000000">
-                      <a:alpha val="43137"/>
-                    </a:srgbClr>
-                  </a:outerShdw>
-                </a:effectLst>
+          <a:lstStyle>
+            <a:lvl1pPr algn="l" defTabSz="914400" rtl="0" eaLnBrk="1" latinLnBrk="0" hangingPunct="1">
+              <a:lnSpc>
+                <a:spcPct val="110000"/>
+              </a:lnSpc>
+              <a:spcBef>
+                <a:spcPct val="0"/>
+              </a:spcBef>
+              <a:buNone/>
+              <a:defRPr sz="6000" b="0" i="0" kern="1200" cap="none" spc="130" baseline="0">
+                <a:solidFill>
+                  <a:schemeClr val="tx1"/>
+                </a:solidFill>
+                <a:latin typeface="+mj-lt"/>
+                <a:ea typeface="+mj-ea"/>
+                <a:cs typeface="+mj-cs"/>
+              </a:defRPr>
+            </a:lvl1pPr>
+          </a:lstStyle>
+          <a:p>
+            <a:r>
+              <a:rPr lang="en-US" altLang="ko-KR" sz="4800" dirty="0">
+                <a:solidFill>
+                  <a:srgbClr val="FFFFFF"/>
+                </a:solidFill>
+                <a:latin typeface="08서울남산체 EB" panose="02020603020101020101" pitchFamily="18" charset="-127"/>
+                <a:ea typeface="08서울남산체 EB" panose="02020603020101020101" pitchFamily="18" charset="-127"/>
+              </a:rPr>
+              <a:t>Array</a:t>
+            </a:r>
+            <a:r>
+              <a:rPr lang="ko-KR" altLang="en-US" sz="4800" dirty="0">
+                <a:solidFill>
+                  <a:srgbClr val="FFFFFF"/>
+                </a:solidFill>
+                <a:latin typeface="08서울남산체 EB" panose="02020603020101020101" pitchFamily="18" charset="-127"/>
+                <a:ea typeface="08서울남산체 EB" panose="02020603020101020101" pitchFamily="18" charset="-127"/>
               </a:rPr>
               <a:t> </a:t>
             </a:r>
-            <a:endParaRPr lang="en-US" altLang="ko-KR" sz="1500" dirty="0">
-              <a:effectLst>
-                <a:outerShdw blurRad="38100" dist="38100" dir="2700000" algn="tl">
-                  <a:srgbClr val="000000">
-                    <a:alpha val="43137"/>
-                  </a:srgbClr>
-                </a:outerShdw>
-              </a:effectLst>
-            </a:endParaRPr>
-          </a:p>
-          <a:p>
-            <a:endParaRPr lang="en-US" altLang="ko-KR" sz="1500" dirty="0">
-              <a:effectLst>
-                <a:outerShdw blurRad="38100" dist="38100" dir="2700000" algn="tl">
-                  <a:srgbClr val="000000">
-                    <a:alpha val="43137"/>
-                  </a:srgbClr>
-                </a:outerShdw>
-              </a:effectLst>
-            </a:endParaRPr>
-          </a:p>
-          <a:p>
-            <a:r>
-              <a:rPr lang="ko-KR" altLang="en-US" sz="1500" b="1" dirty="0">
-                <a:effectLst>
-                  <a:outerShdw blurRad="38100" dist="38100" dir="2700000" algn="tl">
-                    <a:srgbClr val="000000">
-                      <a:alpha val="43137"/>
-                    </a:srgbClr>
-                  </a:outerShdw>
-                </a:effectLst>
-              </a:rPr>
-              <a:t>💻예시 </a:t>
-            </a:r>
-            <a:r>
-              <a:rPr lang="en-US" altLang="ko-KR" sz="1500" b="1" dirty="0">
-                <a:effectLst>
-                  <a:outerShdw blurRad="38100" dist="38100" dir="2700000" algn="tl">
-                    <a:srgbClr val="000000">
-                      <a:alpha val="43137"/>
-                    </a:srgbClr>
-                  </a:outerShdw>
-                </a:effectLst>
-              </a:rPr>
-              <a:t>01</a:t>
-            </a:r>
-          </a:p>
-          <a:p>
-            <a:r>
-              <a:rPr lang="ko-KR" altLang="en-US" sz="1500" dirty="0">
-                <a:effectLst>
-                  <a:outerShdw blurRad="38100" dist="38100" dir="2700000" algn="tl">
-                    <a:srgbClr val="000000">
-                      <a:alpha val="43137"/>
-                    </a:srgbClr>
-                  </a:outerShdw>
-                </a:effectLst>
-              </a:rPr>
-              <a:t>입력 </a:t>
-            </a:r>
-            <a:r>
-              <a:rPr lang="en-US" altLang="ko-KR" sz="1500" dirty="0">
-                <a:effectLst>
-                  <a:outerShdw blurRad="38100" dist="38100" dir="2700000" algn="tl">
-                    <a:srgbClr val="000000">
-                      <a:alpha val="43137"/>
-                    </a:srgbClr>
-                  </a:outerShdw>
-                </a:effectLst>
-              </a:rPr>
-              <a:t>: racecar</a:t>
-            </a:r>
-          </a:p>
-          <a:p>
-            <a:r>
-              <a:rPr lang="ko-KR" altLang="en-US" sz="1500" dirty="0">
-                <a:effectLst>
-                  <a:outerShdw blurRad="38100" dist="38100" dir="2700000" algn="tl">
-                    <a:srgbClr val="000000">
-                      <a:alpha val="43137"/>
-                    </a:srgbClr>
-                  </a:outerShdw>
-                </a:effectLst>
-              </a:rPr>
-              <a:t>출력 </a:t>
-            </a:r>
-            <a:r>
-              <a:rPr lang="en-US" altLang="ko-KR" sz="1500" dirty="0">
-                <a:effectLst>
-                  <a:outerShdw blurRad="38100" dist="38100" dir="2700000" algn="tl">
-                    <a:srgbClr val="000000">
-                      <a:alpha val="43137"/>
-                    </a:srgbClr>
-                  </a:outerShdw>
-                </a:effectLst>
-              </a:rPr>
-              <a:t>: this</a:t>
-            </a:r>
-            <a:r>
-              <a:rPr lang="ko-KR" altLang="en-US" sz="1500" dirty="0">
-                <a:effectLst>
-                  <a:outerShdw blurRad="38100" dist="38100" dir="2700000" algn="tl">
-                    <a:srgbClr val="000000">
-                      <a:alpha val="43137"/>
-                    </a:srgbClr>
-                  </a:outerShdw>
-                </a:effectLst>
+            <a:r>
+              <a:rPr lang="en-US" altLang="ko-KR" sz="4800" dirty="0">
+                <a:solidFill>
+                  <a:srgbClr val="FFFFFF"/>
+                </a:solidFill>
+                <a:latin typeface="08서울남산체 EB" panose="02020603020101020101" pitchFamily="18" charset="-127"/>
+                <a:ea typeface="08서울남산체 EB" panose="02020603020101020101" pitchFamily="18" charset="-127"/>
+              </a:rPr>
+              <a:t>Basic</a:t>
+            </a:r>
+            <a:r>
+              <a:rPr lang="ko-KR" altLang="en-US" sz="4800" dirty="0">
+                <a:solidFill>
+                  <a:srgbClr val="FFFFFF"/>
+                </a:solidFill>
+                <a:latin typeface="08서울남산체 EB" panose="02020603020101020101" pitchFamily="18" charset="-127"/>
+                <a:ea typeface="08서울남산체 EB" panose="02020603020101020101" pitchFamily="18" charset="-127"/>
               </a:rPr>
               <a:t> </a:t>
             </a:r>
             <a:r>
-              <a:rPr lang="en-US" altLang="ko-KR" sz="1500" dirty="0">
-                <a:effectLst>
-                  <a:outerShdw blurRad="38100" dist="38100" dir="2700000" algn="tl">
-                    <a:srgbClr val="000000">
-                      <a:alpha val="43137"/>
-                    </a:srgbClr>
-                  </a:outerShdw>
-                </a:effectLst>
-              </a:rPr>
-              <a:t>is</a:t>
-            </a:r>
-            <a:r>
-              <a:rPr lang="ko-KR" altLang="en-US" sz="1500" dirty="0">
-                <a:effectLst>
-                  <a:outerShdw blurRad="38100" dist="38100" dir="2700000" algn="tl">
-                    <a:srgbClr val="000000">
-                      <a:alpha val="43137"/>
-                    </a:srgbClr>
-                  </a:outerShdw>
-                </a:effectLst>
-              </a:rPr>
-              <a:t> </a:t>
-            </a:r>
-            <a:r>
-              <a:rPr lang="en-US" altLang="ko-KR" sz="1500" dirty="0">
-                <a:effectLst>
-                  <a:outerShdw blurRad="38100" dist="38100" dir="2700000" algn="tl">
-                    <a:srgbClr val="000000">
-                      <a:alpha val="43137"/>
-                    </a:srgbClr>
-                  </a:outerShdw>
-                </a:effectLst>
-              </a:rPr>
-              <a:t>palindrome!!</a:t>
-            </a:r>
-          </a:p>
-          <a:p>
-            <a:endParaRPr lang="en-US" altLang="ko-KR" sz="1500" dirty="0">
-              <a:effectLst>
-                <a:outerShdw blurRad="38100" dist="38100" dir="2700000" algn="tl">
-                  <a:srgbClr val="000000">
-                    <a:alpha val="43137"/>
-                  </a:srgbClr>
-                </a:outerShdw>
-              </a:effectLst>
-            </a:endParaRPr>
-          </a:p>
-          <a:p>
-            <a:r>
-              <a:rPr lang="ko-KR" altLang="en-US" sz="1500" b="1" dirty="0">
-                <a:effectLst>
-                  <a:outerShdw blurRad="38100" dist="38100" dir="2700000" algn="tl">
-                    <a:srgbClr val="000000">
-                      <a:alpha val="43137"/>
-                    </a:srgbClr>
-                  </a:outerShdw>
-                </a:effectLst>
-              </a:rPr>
-              <a:t>💻예시 </a:t>
-            </a:r>
-            <a:r>
-              <a:rPr lang="en-US" altLang="ko-KR" sz="1500" b="1" dirty="0">
-                <a:effectLst>
-                  <a:outerShdw blurRad="38100" dist="38100" dir="2700000" algn="tl">
-                    <a:srgbClr val="000000">
-                      <a:alpha val="43137"/>
-                    </a:srgbClr>
-                  </a:outerShdw>
-                </a:effectLst>
-              </a:rPr>
-              <a:t>02</a:t>
-            </a:r>
-          </a:p>
-          <a:p>
-            <a:r>
-              <a:rPr lang="ko-KR" altLang="en-US" sz="1500" dirty="0">
-                <a:effectLst>
-                  <a:outerShdw blurRad="38100" dist="38100" dir="2700000" algn="tl">
-                    <a:srgbClr val="000000">
-                      <a:alpha val="43137"/>
-                    </a:srgbClr>
-                  </a:outerShdw>
-                </a:effectLst>
-              </a:rPr>
-              <a:t>입력 </a:t>
-            </a:r>
-            <a:r>
-              <a:rPr lang="en-US" altLang="ko-KR" sz="1500" dirty="0">
-                <a:effectLst>
-                  <a:outerShdw blurRad="38100" dist="38100" dir="2700000" algn="tl">
-                    <a:srgbClr val="000000">
-                      <a:alpha val="43137"/>
-                    </a:srgbClr>
-                  </a:outerShdw>
-                </a:effectLst>
-              </a:rPr>
-              <a:t>: </a:t>
-            </a:r>
-            <a:r>
-              <a:rPr lang="en-US" altLang="ko-KR" sz="1500" dirty="0" err="1">
-                <a:effectLst>
-                  <a:outerShdw blurRad="38100" dist="38100" dir="2700000" algn="tl">
-                    <a:srgbClr val="000000">
-                      <a:alpha val="43137"/>
-                    </a:srgbClr>
-                  </a:outerShdw>
-                </a:effectLst>
-              </a:rPr>
-              <a:t>raceccr</a:t>
-            </a:r>
-            <a:endParaRPr lang="en-US" altLang="ko-KR" sz="1500" dirty="0">
-              <a:effectLst>
-                <a:outerShdw blurRad="38100" dist="38100" dir="2700000" algn="tl">
-                  <a:srgbClr val="000000">
-                    <a:alpha val="43137"/>
-                  </a:srgbClr>
-                </a:outerShdw>
-              </a:effectLst>
-            </a:endParaRPr>
-          </a:p>
-          <a:p>
-            <a:r>
-              <a:rPr lang="ko-KR" altLang="en-US" sz="1500" dirty="0">
-                <a:effectLst>
-                  <a:outerShdw blurRad="38100" dist="38100" dir="2700000" algn="tl">
-                    <a:srgbClr val="000000">
-                      <a:alpha val="43137"/>
-                    </a:srgbClr>
-                  </a:outerShdw>
-                </a:effectLst>
-              </a:rPr>
-              <a:t>출력 </a:t>
-            </a:r>
-            <a:r>
-              <a:rPr lang="en-US" altLang="ko-KR" sz="1500" dirty="0">
-                <a:effectLst>
-                  <a:outerShdw blurRad="38100" dist="38100" dir="2700000" algn="tl">
-                    <a:srgbClr val="000000">
-                      <a:alpha val="43137"/>
-                    </a:srgbClr>
-                  </a:outerShdw>
-                </a:effectLst>
-              </a:rPr>
-              <a:t>: this</a:t>
-            </a:r>
-            <a:r>
-              <a:rPr lang="ko-KR" altLang="en-US" sz="1500" dirty="0">
-                <a:effectLst>
-                  <a:outerShdw blurRad="38100" dist="38100" dir="2700000" algn="tl">
-                    <a:srgbClr val="000000">
-                      <a:alpha val="43137"/>
-                    </a:srgbClr>
-                  </a:outerShdw>
-                </a:effectLst>
-              </a:rPr>
-              <a:t> </a:t>
-            </a:r>
-            <a:r>
-              <a:rPr lang="en-US" altLang="ko-KR" sz="1500" dirty="0">
-                <a:effectLst>
-                  <a:outerShdw blurRad="38100" dist="38100" dir="2700000" algn="tl">
-                    <a:srgbClr val="000000">
-                      <a:alpha val="43137"/>
-                    </a:srgbClr>
-                  </a:outerShdw>
-                </a:effectLst>
-              </a:rPr>
-              <a:t>is not</a:t>
-            </a:r>
-            <a:r>
-              <a:rPr lang="ko-KR" altLang="en-US" sz="1500" dirty="0">
-                <a:effectLst>
-                  <a:outerShdw blurRad="38100" dist="38100" dir="2700000" algn="tl">
-                    <a:srgbClr val="000000">
-                      <a:alpha val="43137"/>
-                    </a:srgbClr>
-                  </a:outerShdw>
-                </a:effectLst>
-              </a:rPr>
-              <a:t> </a:t>
-            </a:r>
-            <a:r>
-              <a:rPr lang="en-US" altLang="ko-KR" sz="1500" dirty="0">
-                <a:effectLst>
-                  <a:outerShdw blurRad="38100" dist="38100" dir="2700000" algn="tl">
-                    <a:srgbClr val="000000">
-                      <a:alpha val="43137"/>
-                    </a:srgbClr>
-                  </a:outerShdw>
-                </a:effectLst>
-              </a:rPr>
-              <a:t>palindrome...</a:t>
-            </a:r>
-          </a:p>
-          <a:p>
-            <a:endParaRPr lang="en-US" altLang="ko-KR" sz="1500" dirty="0">
-              <a:effectLst>
-                <a:outerShdw blurRad="38100" dist="38100" dir="2700000" algn="tl">
-                  <a:srgbClr val="000000">
-                    <a:alpha val="43137"/>
-                  </a:srgbClr>
-                </a:outerShdw>
-              </a:effectLst>
+              <a:rPr lang="en-US" altLang="ko-KR" sz="4800" dirty="0">
+                <a:solidFill>
+                  <a:srgbClr val="FFFFFF"/>
+                </a:solidFill>
+                <a:latin typeface="08서울남산체 EB" panose="02020603020101020101" pitchFamily="18" charset="-127"/>
+                <a:ea typeface="08서울남산체 EB" panose="02020603020101020101" pitchFamily="18" charset="-127"/>
+              </a:rPr>
+              <a:t>(01)</a:t>
+            </a:r>
+            <a:endParaRPr lang="ko-KR" altLang="en-US" sz="4800" dirty="0">
+              <a:solidFill>
+                <a:srgbClr val="FFFFFF"/>
+              </a:solidFill>
+              <a:latin typeface="08서울남산체 EB" panose="02020603020101020101" pitchFamily="18" charset="-127"/>
+              <a:ea typeface="08서울남산체 EB" panose="02020603020101020101" pitchFamily="18" charset="-127"/>
             </a:endParaRPr>
           </a:p>
         </p:txBody>
       </p:sp>
       <p:pic>
         <p:nvPicPr>
-          <p:cNvPr id="7" name="그림 6">
-            <a:extLst>
-              <a:ext uri="{FF2B5EF4-FFF2-40B4-BE49-F238E27FC236}">
-                <a16:creationId xmlns:a16="http://schemas.microsoft.com/office/drawing/2014/main" id="{9A4711EC-1AE5-40BD-9CC0-664EC436D217}"/>
+          <p:cNvPr id="9" name="그림 8">
+            <a:extLst>
+              <a:ext uri="{FF2B5EF4-FFF2-40B4-BE49-F238E27FC236}">
+                <a16:creationId xmlns:a16="http://schemas.microsoft.com/office/drawing/2014/main" id="{FC2FDB5D-6FF1-484C-99F7-73F9CC8D8D4B}"/>
               </a:ext>
             </a:extLst>
           </p:cNvPr>
@@ -8043,8 +7238,8 @@
         </p:blipFill>
         <p:spPr>
           <a:xfrm>
-            <a:off x="6713333" y="3321424"/>
-            <a:ext cx="5079197" cy="1591587"/>
+            <a:off x="1090655" y="1762432"/>
+            <a:ext cx="10564983" cy="3576050"/>
           </a:xfrm>
           <a:prstGeom prst="rect">
             <a:avLst/>
@@ -8053,10 +7248,10 @@
       </p:pic>
       <p:pic>
         <p:nvPicPr>
-          <p:cNvPr id="9" name="그림 8">
-            <a:extLst>
-              <a:ext uri="{FF2B5EF4-FFF2-40B4-BE49-F238E27FC236}">
-                <a16:creationId xmlns:a16="http://schemas.microsoft.com/office/drawing/2014/main" id="{4998D6F1-C37E-4749-968E-15B1B0791408}"/>
+          <p:cNvPr id="12" name="그림 11">
+            <a:extLst>
+              <a:ext uri="{FF2B5EF4-FFF2-40B4-BE49-F238E27FC236}">
+                <a16:creationId xmlns:a16="http://schemas.microsoft.com/office/drawing/2014/main" id="{D3D3F126-C616-4F86-8AD8-93BA07D023E0}"/>
               </a:ext>
             </a:extLst>
           </p:cNvPr>
@@ -8073,8 +7268,8 @@
         </p:blipFill>
         <p:spPr>
           <a:xfrm>
-            <a:off x="6713337" y="4930735"/>
-            <a:ext cx="5079196" cy="1448754"/>
+            <a:off x="6323527" y="1037964"/>
+            <a:ext cx="5332111" cy="1167840"/>
           </a:xfrm>
           <a:prstGeom prst="rect">
             <a:avLst/>
@@ -8084,7 +7279,7 @@
     </p:spTree>
     <p:extLst>
       <p:ext uri="{BB962C8B-B14F-4D97-AF65-F5344CB8AC3E}">
-        <p14:creationId xmlns:p14="http://schemas.microsoft.com/office/powerpoint/2010/main" val="1778783313"/>
+        <p14:creationId xmlns:p14="http://schemas.microsoft.com/office/powerpoint/2010/main" val="2994287922"/>
       </p:ext>
     </p:extLst>
   </p:cSld>
@@ -8230,7 +7425,9 @@
             <a:r>
               <a:rPr lang="ko-KR" altLang="en-US" sz="2800" dirty="0">
                 <a:solidFill>
-                  <a:srgbClr val="FFFFFF"/>
+                  <a:schemeClr val="bg1">
+                    <a:lumMod val="50000"/>
+                  </a:schemeClr>
                 </a:solidFill>
                 <a:effectLst>
                   <a:outerShdw blurRad="38100" dist="38100" dir="2700000" algn="tl">
@@ -8245,7 +7442,9 @@
             <a:r>
               <a:rPr lang="en-US" altLang="ko-KR" sz="2800" dirty="0">
                 <a:solidFill>
-                  <a:srgbClr val="FFFFFF"/>
+                  <a:schemeClr val="bg1">
+                    <a:lumMod val="50000"/>
+                  </a:schemeClr>
                 </a:solidFill>
                 <a:effectLst>
                   <a:outerShdw blurRad="38100" dist="38100" dir="2700000" algn="tl">
@@ -8262,7 +7461,9 @@
             <a:r>
               <a:rPr lang="ko-KR" altLang="en-US" sz="2800" dirty="0">
                 <a:solidFill>
-                  <a:srgbClr val="FFFFFF"/>
+                  <a:schemeClr val="bg1">
+                    <a:lumMod val="50000"/>
+                  </a:schemeClr>
                 </a:solidFill>
                 <a:effectLst>
                   <a:outerShdw blurRad="38100" dist="38100" dir="2700000" algn="tl">
@@ -8277,7 +7478,9 @@
             <a:r>
               <a:rPr lang="en-US" altLang="ko-KR" sz="2800" dirty="0">
                 <a:solidFill>
-                  <a:srgbClr val="FFFFFF"/>
+                  <a:schemeClr val="bg1">
+                    <a:lumMod val="50000"/>
+                  </a:schemeClr>
                 </a:solidFill>
                 <a:effectLst>
                   <a:outerShdw blurRad="38100" dist="38100" dir="2700000" algn="tl">
@@ -8294,7 +7497,9 @@
             <a:r>
               <a:rPr lang="ko-KR" altLang="en-US" sz="2800" dirty="0">
                 <a:solidFill>
-                  <a:srgbClr val="FFFFFF"/>
+                  <a:schemeClr val="bg1">
+                    <a:lumMod val="50000"/>
+                  </a:schemeClr>
                 </a:solidFill>
                 <a:effectLst>
                   <a:outerShdw blurRad="38100" dist="38100" dir="2700000" algn="tl">
@@ -8309,7 +7514,9 @@
             <a:r>
               <a:rPr lang="en-US" altLang="ko-KR" sz="2800" dirty="0">
                 <a:solidFill>
-                  <a:srgbClr val="FFFFFF"/>
+                  <a:schemeClr val="bg1">
+                    <a:lumMod val="50000"/>
+                  </a:schemeClr>
                 </a:solidFill>
                 <a:effectLst>
                   <a:outerShdw blurRad="38100" dist="38100" dir="2700000" algn="tl">
@@ -8326,7 +7533,9 @@
             <a:r>
               <a:rPr lang="ko-KR" altLang="en-US" sz="2800" dirty="0">
                 <a:solidFill>
-                  <a:srgbClr val="FFFFFF"/>
+                  <a:schemeClr val="bg1">
+                    <a:lumMod val="50000"/>
+                  </a:schemeClr>
                 </a:solidFill>
                 <a:effectLst>
                   <a:outerShdw blurRad="38100" dist="38100" dir="2700000" algn="tl">
@@ -8341,7 +7550,9 @@
             <a:r>
               <a:rPr lang="en-US" altLang="ko-KR" sz="2800" dirty="0">
                 <a:solidFill>
-                  <a:srgbClr val="FFFFFF"/>
+                  <a:schemeClr val="bg1">
+                    <a:lumMod val="50000"/>
+                  </a:schemeClr>
                 </a:solidFill>
                 <a:effectLst>
                   <a:outerShdw blurRad="38100" dist="38100" dir="2700000" algn="tl">
@@ -8528,8 +7739,1913 @@
 </p:sld>
 </file>
 
+<file path=ppt/slides/slide20.xml><?xml version="1.0" encoding="utf-8"?>
+<p:sld xmlns:a="http://schemas.openxmlformats.org/drawingml/2006/main" xmlns:r="http://schemas.openxmlformats.org/officeDocument/2006/relationships" xmlns:p="http://schemas.openxmlformats.org/presentationml/2006/main">
+  <p:cSld>
+    <p:spTree>
+      <p:nvGrpSpPr>
+        <p:cNvPr id="1" name=""/>
+        <p:cNvGrpSpPr/>
+        <p:nvPr/>
+      </p:nvGrpSpPr>
+      <p:grpSpPr>
+        <a:xfrm>
+          <a:off x="0" y="0"/>
+          <a:ext cx="0" cy="0"/>
+          <a:chOff x="0" y="0"/>
+          <a:chExt cx="0" cy="0"/>
+        </a:xfrm>
+      </p:grpSpPr>
+      <p:pic>
+        <p:nvPicPr>
+          <p:cNvPr id="4" name="Picture 3" descr="강의 항공 사진">
+            <a:extLst>
+              <a:ext uri="{FF2B5EF4-FFF2-40B4-BE49-F238E27FC236}">
+                <a16:creationId xmlns:a16="http://schemas.microsoft.com/office/drawing/2014/main" id="{51D8E78A-5FBA-4684-91F9-26308D1DC1C8}"/>
+              </a:ext>
+            </a:extLst>
+          </p:cNvPr>
+          <p:cNvPicPr>
+            <a:picLocks noChangeAspect="1"/>
+          </p:cNvPicPr>
+          <p:nvPr/>
+        </p:nvPicPr>
+        <p:blipFill rotWithShape="1">
+          <a:blip r:embed="rId2">
+            <a:duotone>
+              <a:schemeClr val="accent1">
+                <a:shade val="45000"/>
+                <a:satMod val="135000"/>
+              </a:schemeClr>
+              <a:prstClr val="white"/>
+            </a:duotone>
+            <a:alphaModFix amt="35000"/>
+          </a:blip>
+          <a:srcRect l="73"/>
+          <a:stretch/>
+        </p:blipFill>
+        <p:spPr>
+          <a:xfrm>
+            <a:off x="1" y="10"/>
+            <a:ext cx="12183122" cy="6857989"/>
+          </a:xfrm>
+          <a:prstGeom prst="rect">
+            <a:avLst/>
+          </a:prstGeom>
+        </p:spPr>
+      </p:pic>
+      <p:sp>
+        <p:nvSpPr>
+          <p:cNvPr id="5" name="제목 1">
+            <a:extLst>
+              <a:ext uri="{FF2B5EF4-FFF2-40B4-BE49-F238E27FC236}">
+                <a16:creationId xmlns:a16="http://schemas.microsoft.com/office/drawing/2014/main" id="{51702DA7-ABB5-4108-8A07-6B2E47894A6E}"/>
+              </a:ext>
+            </a:extLst>
+          </p:cNvPr>
+          <p:cNvSpPr>
+            <a:spLocks noGrp="1"/>
+          </p:cNvSpPr>
+          <p:nvPr>
+            <p:ph type="ctrTitle"/>
+          </p:nvPr>
+        </p:nvSpPr>
+        <p:spPr>
+          <a:xfrm>
+            <a:off x="8877" y="-270052"/>
+            <a:ext cx="9430958" cy="1167841"/>
+          </a:xfrm>
+        </p:spPr>
+        <p:txBody>
+          <a:bodyPr anchor="b">
+            <a:normAutofit/>
+          </a:bodyPr>
+          <a:lstStyle/>
+          <a:p>
+            <a:r>
+              <a:rPr lang="en-US" altLang="ko-KR" sz="4800" dirty="0">
+                <a:solidFill>
+                  <a:schemeClr val="tx1">
+                    <a:lumMod val="75000"/>
+                    <a:lumOff val="25000"/>
+                  </a:schemeClr>
+                </a:solidFill>
+                <a:latin typeface="08서울남산체 EB" panose="02020603020101020101" pitchFamily="18" charset="-127"/>
+                <a:ea typeface="08서울남산체 EB" panose="02020603020101020101" pitchFamily="18" charset="-127"/>
+              </a:rPr>
+              <a:t>Array Basic (01)</a:t>
+            </a:r>
+            <a:endParaRPr lang="ko-KR" altLang="en-US" sz="4800" dirty="0">
+              <a:solidFill>
+                <a:schemeClr val="tx1">
+                  <a:lumMod val="75000"/>
+                  <a:lumOff val="25000"/>
+                </a:schemeClr>
+              </a:solidFill>
+              <a:latin typeface="08서울남산체 EB" panose="02020603020101020101" pitchFamily="18" charset="-127"/>
+              <a:ea typeface="08서울남산체 EB" panose="02020603020101020101" pitchFamily="18" charset="-127"/>
+            </a:endParaRPr>
+          </a:p>
+        </p:txBody>
+      </p:sp>
+      <p:sp>
+        <p:nvSpPr>
+          <p:cNvPr id="6" name="제목 1">
+            <a:extLst>
+              <a:ext uri="{FF2B5EF4-FFF2-40B4-BE49-F238E27FC236}">
+                <a16:creationId xmlns:a16="http://schemas.microsoft.com/office/drawing/2014/main" id="{9F4EC6B0-B381-4838-A787-D6F8E36BDC5A}"/>
+              </a:ext>
+            </a:extLst>
+          </p:cNvPr>
+          <p:cNvSpPr txBox="1">
+            <a:spLocks/>
+          </p:cNvSpPr>
+          <p:nvPr/>
+        </p:nvSpPr>
+        <p:spPr>
+          <a:xfrm>
+            <a:off x="-46395" y="-281086"/>
+            <a:ext cx="9430958" cy="1167841"/>
+          </a:xfrm>
+          <a:prstGeom prst="rect">
+            <a:avLst/>
+          </a:prstGeom>
+        </p:spPr>
+        <p:txBody>
+          <a:bodyPr lIns="109728" tIns="109728" rIns="109728" bIns="91440" anchor="b">
+            <a:normAutofit/>
+          </a:bodyPr>
+          <a:lstStyle>
+            <a:lvl1pPr algn="l" defTabSz="914400" rtl="0" eaLnBrk="1" latinLnBrk="0" hangingPunct="1">
+              <a:lnSpc>
+                <a:spcPct val="110000"/>
+              </a:lnSpc>
+              <a:spcBef>
+                <a:spcPct val="0"/>
+              </a:spcBef>
+              <a:buNone/>
+              <a:defRPr sz="6000" b="0" i="0" kern="1200" cap="none" spc="130" baseline="0">
+                <a:solidFill>
+                  <a:schemeClr val="tx1"/>
+                </a:solidFill>
+                <a:latin typeface="+mj-lt"/>
+                <a:ea typeface="+mj-ea"/>
+                <a:cs typeface="+mj-cs"/>
+              </a:defRPr>
+            </a:lvl1pPr>
+          </a:lstStyle>
+          <a:p>
+            <a:r>
+              <a:rPr lang="en-US" altLang="ko-KR" sz="4800" dirty="0">
+                <a:solidFill>
+                  <a:srgbClr val="FFFFFF"/>
+                </a:solidFill>
+                <a:latin typeface="08서울남산체 EB" panose="02020603020101020101" pitchFamily="18" charset="-127"/>
+                <a:ea typeface="08서울남산체 EB" panose="02020603020101020101" pitchFamily="18" charset="-127"/>
+              </a:rPr>
+              <a:t>Array</a:t>
+            </a:r>
+            <a:r>
+              <a:rPr lang="ko-KR" altLang="en-US" sz="4800" dirty="0">
+                <a:solidFill>
+                  <a:srgbClr val="FFFFFF"/>
+                </a:solidFill>
+                <a:latin typeface="08서울남산체 EB" panose="02020603020101020101" pitchFamily="18" charset="-127"/>
+                <a:ea typeface="08서울남산체 EB" panose="02020603020101020101" pitchFamily="18" charset="-127"/>
+              </a:rPr>
+              <a:t> </a:t>
+            </a:r>
+            <a:r>
+              <a:rPr lang="en-US" altLang="ko-KR" sz="4800" dirty="0">
+                <a:solidFill>
+                  <a:srgbClr val="FFFFFF"/>
+                </a:solidFill>
+                <a:latin typeface="08서울남산체 EB" panose="02020603020101020101" pitchFamily="18" charset="-127"/>
+                <a:ea typeface="08서울남산체 EB" panose="02020603020101020101" pitchFamily="18" charset="-127"/>
+              </a:rPr>
+              <a:t>Basic</a:t>
+            </a:r>
+            <a:r>
+              <a:rPr lang="ko-KR" altLang="en-US" sz="4800" dirty="0">
+                <a:solidFill>
+                  <a:srgbClr val="FFFFFF"/>
+                </a:solidFill>
+                <a:latin typeface="08서울남산체 EB" panose="02020603020101020101" pitchFamily="18" charset="-127"/>
+                <a:ea typeface="08서울남산체 EB" panose="02020603020101020101" pitchFamily="18" charset="-127"/>
+              </a:rPr>
+              <a:t> </a:t>
+            </a:r>
+            <a:r>
+              <a:rPr lang="en-US" altLang="ko-KR" sz="4800" dirty="0">
+                <a:solidFill>
+                  <a:srgbClr val="FFFFFF"/>
+                </a:solidFill>
+                <a:latin typeface="08서울남산체 EB" panose="02020603020101020101" pitchFamily="18" charset="-127"/>
+                <a:ea typeface="08서울남산체 EB" panose="02020603020101020101" pitchFamily="18" charset="-127"/>
+              </a:rPr>
+              <a:t>(01)</a:t>
+            </a:r>
+            <a:endParaRPr lang="ko-KR" altLang="en-US" sz="4800" dirty="0">
+              <a:solidFill>
+                <a:srgbClr val="FFFFFF"/>
+              </a:solidFill>
+              <a:latin typeface="08서울남산체 EB" panose="02020603020101020101" pitchFamily="18" charset="-127"/>
+              <a:ea typeface="08서울남산체 EB" panose="02020603020101020101" pitchFamily="18" charset="-127"/>
+            </a:endParaRPr>
+          </a:p>
+        </p:txBody>
+      </p:sp>
+      <p:pic>
+        <p:nvPicPr>
+          <p:cNvPr id="8" name="그림 7">
+            <a:extLst>
+              <a:ext uri="{FF2B5EF4-FFF2-40B4-BE49-F238E27FC236}">
+                <a16:creationId xmlns:a16="http://schemas.microsoft.com/office/drawing/2014/main" id="{46E73F24-A832-477C-BB7D-DE0D23B8D1D9}"/>
+              </a:ext>
+            </a:extLst>
+          </p:cNvPr>
+          <p:cNvPicPr>
+            <a:picLocks noChangeAspect="1"/>
+          </p:cNvPicPr>
+          <p:nvPr/>
+        </p:nvPicPr>
+        <p:blipFill>
+          <a:blip r:embed="rId3"/>
+          <a:stretch>
+            <a:fillRect/>
+          </a:stretch>
+        </p:blipFill>
+        <p:spPr>
+          <a:xfrm>
+            <a:off x="1021893" y="1062687"/>
+            <a:ext cx="10742245" cy="4410265"/>
+          </a:xfrm>
+          <a:prstGeom prst="rect">
+            <a:avLst/>
+          </a:prstGeom>
+        </p:spPr>
+      </p:pic>
+      <p:pic>
+        <p:nvPicPr>
+          <p:cNvPr id="11" name="그림 10">
+            <a:extLst>
+              <a:ext uri="{FF2B5EF4-FFF2-40B4-BE49-F238E27FC236}">
+                <a16:creationId xmlns:a16="http://schemas.microsoft.com/office/drawing/2014/main" id="{10B09E55-FAAF-40C8-81B4-84852FCFFA45}"/>
+              </a:ext>
+            </a:extLst>
+          </p:cNvPr>
+          <p:cNvPicPr>
+            <a:picLocks noChangeAspect="1"/>
+          </p:cNvPicPr>
+          <p:nvPr/>
+        </p:nvPicPr>
+        <p:blipFill>
+          <a:blip r:embed="rId4"/>
+          <a:stretch>
+            <a:fillRect/>
+          </a:stretch>
+        </p:blipFill>
+        <p:spPr>
+          <a:xfrm>
+            <a:off x="1021893" y="5382521"/>
+            <a:ext cx="8189342" cy="1157190"/>
+          </a:xfrm>
+          <a:prstGeom prst="rect">
+            <a:avLst/>
+          </a:prstGeom>
+        </p:spPr>
+      </p:pic>
+    </p:spTree>
+    <p:extLst>
+      <p:ext uri="{BB962C8B-B14F-4D97-AF65-F5344CB8AC3E}">
+        <p14:creationId xmlns:p14="http://schemas.microsoft.com/office/powerpoint/2010/main" val="3762556151"/>
+      </p:ext>
+    </p:extLst>
+  </p:cSld>
+  <p:clrMapOvr>
+    <a:masterClrMapping/>
+  </p:clrMapOvr>
+</p:sld>
+</file>
+
+<file path=ppt/slides/slide21.xml><?xml version="1.0" encoding="utf-8"?>
+<p:sld xmlns:a="http://schemas.openxmlformats.org/drawingml/2006/main" xmlns:r="http://schemas.openxmlformats.org/officeDocument/2006/relationships" xmlns:p="http://schemas.openxmlformats.org/presentationml/2006/main">
+  <p:cSld>
+    <p:spTree>
+      <p:nvGrpSpPr>
+        <p:cNvPr id="1" name=""/>
+        <p:cNvGrpSpPr/>
+        <p:nvPr/>
+      </p:nvGrpSpPr>
+      <p:grpSpPr>
+        <a:xfrm>
+          <a:off x="0" y="0"/>
+          <a:ext cx="0" cy="0"/>
+          <a:chOff x="0" y="0"/>
+          <a:chExt cx="0" cy="0"/>
+        </a:xfrm>
+      </p:grpSpPr>
+      <p:pic>
+        <p:nvPicPr>
+          <p:cNvPr id="4" name="Picture 3" descr="강의 항공 사진">
+            <a:extLst>
+              <a:ext uri="{FF2B5EF4-FFF2-40B4-BE49-F238E27FC236}">
+                <a16:creationId xmlns:a16="http://schemas.microsoft.com/office/drawing/2014/main" id="{51D8E78A-5FBA-4684-91F9-26308D1DC1C8}"/>
+              </a:ext>
+            </a:extLst>
+          </p:cNvPr>
+          <p:cNvPicPr>
+            <a:picLocks noChangeAspect="1"/>
+          </p:cNvPicPr>
+          <p:nvPr/>
+        </p:nvPicPr>
+        <p:blipFill rotWithShape="1">
+          <a:blip r:embed="rId2">
+            <a:duotone>
+              <a:schemeClr val="accent1">
+                <a:shade val="45000"/>
+                <a:satMod val="135000"/>
+              </a:schemeClr>
+              <a:prstClr val="white"/>
+            </a:duotone>
+            <a:alphaModFix amt="35000"/>
+          </a:blip>
+          <a:srcRect l="73"/>
+          <a:stretch/>
+        </p:blipFill>
+        <p:spPr>
+          <a:xfrm>
+            <a:off x="1" y="10"/>
+            <a:ext cx="12183122" cy="6857989"/>
+          </a:xfrm>
+          <a:prstGeom prst="rect">
+            <a:avLst/>
+          </a:prstGeom>
+        </p:spPr>
+      </p:pic>
+      <p:sp>
+        <p:nvSpPr>
+          <p:cNvPr id="5" name="제목 1">
+            <a:extLst>
+              <a:ext uri="{FF2B5EF4-FFF2-40B4-BE49-F238E27FC236}">
+                <a16:creationId xmlns:a16="http://schemas.microsoft.com/office/drawing/2014/main" id="{51702DA7-ABB5-4108-8A07-6B2E47894A6E}"/>
+              </a:ext>
+            </a:extLst>
+          </p:cNvPr>
+          <p:cNvSpPr>
+            <a:spLocks noGrp="1"/>
+          </p:cNvSpPr>
+          <p:nvPr>
+            <p:ph type="ctrTitle"/>
+          </p:nvPr>
+        </p:nvSpPr>
+        <p:spPr>
+          <a:xfrm>
+            <a:off x="8877" y="-270052"/>
+            <a:ext cx="9430958" cy="1167841"/>
+          </a:xfrm>
+        </p:spPr>
+        <p:txBody>
+          <a:bodyPr anchor="b">
+            <a:normAutofit/>
+          </a:bodyPr>
+          <a:lstStyle/>
+          <a:p>
+            <a:r>
+              <a:rPr lang="en-US" altLang="ko-KR" sz="4800" dirty="0">
+                <a:solidFill>
+                  <a:schemeClr val="tx1">
+                    <a:lumMod val="75000"/>
+                    <a:lumOff val="25000"/>
+                  </a:schemeClr>
+                </a:solidFill>
+                <a:latin typeface="08서울남산체 EB" panose="02020603020101020101" pitchFamily="18" charset="-127"/>
+                <a:ea typeface="08서울남산체 EB" panose="02020603020101020101" pitchFamily="18" charset="-127"/>
+              </a:rPr>
+              <a:t>Array Basic (01)</a:t>
+            </a:r>
+            <a:endParaRPr lang="ko-KR" altLang="en-US" sz="4800" dirty="0">
+              <a:solidFill>
+                <a:schemeClr val="tx1">
+                  <a:lumMod val="75000"/>
+                  <a:lumOff val="25000"/>
+                </a:schemeClr>
+              </a:solidFill>
+              <a:latin typeface="08서울남산체 EB" panose="02020603020101020101" pitchFamily="18" charset="-127"/>
+              <a:ea typeface="08서울남산체 EB" panose="02020603020101020101" pitchFamily="18" charset="-127"/>
+            </a:endParaRPr>
+          </a:p>
+        </p:txBody>
+      </p:sp>
+      <p:sp>
+        <p:nvSpPr>
+          <p:cNvPr id="6" name="제목 1">
+            <a:extLst>
+              <a:ext uri="{FF2B5EF4-FFF2-40B4-BE49-F238E27FC236}">
+                <a16:creationId xmlns:a16="http://schemas.microsoft.com/office/drawing/2014/main" id="{9F4EC6B0-B381-4838-A787-D6F8E36BDC5A}"/>
+              </a:ext>
+            </a:extLst>
+          </p:cNvPr>
+          <p:cNvSpPr txBox="1">
+            <a:spLocks/>
+          </p:cNvSpPr>
+          <p:nvPr/>
+        </p:nvSpPr>
+        <p:spPr>
+          <a:xfrm>
+            <a:off x="-46395" y="-281086"/>
+            <a:ext cx="9430958" cy="1167841"/>
+          </a:xfrm>
+          <a:prstGeom prst="rect">
+            <a:avLst/>
+          </a:prstGeom>
+        </p:spPr>
+        <p:txBody>
+          <a:bodyPr lIns="109728" tIns="109728" rIns="109728" bIns="91440" anchor="b">
+            <a:normAutofit/>
+          </a:bodyPr>
+          <a:lstStyle>
+            <a:lvl1pPr algn="l" defTabSz="914400" rtl="0" eaLnBrk="1" latinLnBrk="0" hangingPunct="1">
+              <a:lnSpc>
+                <a:spcPct val="110000"/>
+              </a:lnSpc>
+              <a:spcBef>
+                <a:spcPct val="0"/>
+              </a:spcBef>
+              <a:buNone/>
+              <a:defRPr sz="6000" b="0" i="0" kern="1200" cap="none" spc="130" baseline="0">
+                <a:solidFill>
+                  <a:schemeClr val="tx1"/>
+                </a:solidFill>
+                <a:latin typeface="+mj-lt"/>
+                <a:ea typeface="+mj-ea"/>
+                <a:cs typeface="+mj-cs"/>
+              </a:defRPr>
+            </a:lvl1pPr>
+          </a:lstStyle>
+          <a:p>
+            <a:r>
+              <a:rPr lang="en-US" altLang="ko-KR" sz="4800" dirty="0">
+                <a:solidFill>
+                  <a:srgbClr val="FFFFFF"/>
+                </a:solidFill>
+                <a:latin typeface="08서울남산체 EB" panose="02020603020101020101" pitchFamily="18" charset="-127"/>
+                <a:ea typeface="08서울남산체 EB" panose="02020603020101020101" pitchFamily="18" charset="-127"/>
+              </a:rPr>
+              <a:t>Array</a:t>
+            </a:r>
+            <a:r>
+              <a:rPr lang="ko-KR" altLang="en-US" sz="4800" dirty="0">
+                <a:solidFill>
+                  <a:srgbClr val="FFFFFF"/>
+                </a:solidFill>
+                <a:latin typeface="08서울남산체 EB" panose="02020603020101020101" pitchFamily="18" charset="-127"/>
+                <a:ea typeface="08서울남산체 EB" panose="02020603020101020101" pitchFamily="18" charset="-127"/>
+              </a:rPr>
+              <a:t> </a:t>
+            </a:r>
+            <a:r>
+              <a:rPr lang="en-US" altLang="ko-KR" sz="4800" dirty="0">
+                <a:solidFill>
+                  <a:srgbClr val="FFFFFF"/>
+                </a:solidFill>
+                <a:latin typeface="08서울남산체 EB" panose="02020603020101020101" pitchFamily="18" charset="-127"/>
+                <a:ea typeface="08서울남산체 EB" panose="02020603020101020101" pitchFamily="18" charset="-127"/>
+              </a:rPr>
+              <a:t>Basic</a:t>
+            </a:r>
+            <a:r>
+              <a:rPr lang="ko-KR" altLang="en-US" sz="4800" dirty="0">
+                <a:solidFill>
+                  <a:srgbClr val="FFFFFF"/>
+                </a:solidFill>
+                <a:latin typeface="08서울남산체 EB" panose="02020603020101020101" pitchFamily="18" charset="-127"/>
+                <a:ea typeface="08서울남산체 EB" panose="02020603020101020101" pitchFamily="18" charset="-127"/>
+              </a:rPr>
+              <a:t> </a:t>
+            </a:r>
+            <a:r>
+              <a:rPr lang="en-US" altLang="ko-KR" sz="4800" dirty="0">
+                <a:solidFill>
+                  <a:srgbClr val="FFFFFF"/>
+                </a:solidFill>
+                <a:latin typeface="08서울남산체 EB" panose="02020603020101020101" pitchFamily="18" charset="-127"/>
+                <a:ea typeface="08서울남산체 EB" panose="02020603020101020101" pitchFamily="18" charset="-127"/>
+              </a:rPr>
+              <a:t>(01)</a:t>
+            </a:r>
+            <a:endParaRPr lang="ko-KR" altLang="en-US" sz="4800" dirty="0">
+              <a:solidFill>
+                <a:srgbClr val="FFFFFF"/>
+              </a:solidFill>
+              <a:latin typeface="08서울남산체 EB" panose="02020603020101020101" pitchFamily="18" charset="-127"/>
+              <a:ea typeface="08서울남산체 EB" panose="02020603020101020101" pitchFamily="18" charset="-127"/>
+            </a:endParaRPr>
+          </a:p>
+        </p:txBody>
+      </p:sp>
+      <p:pic>
+        <p:nvPicPr>
+          <p:cNvPr id="3" name="그림 2">
+            <a:extLst>
+              <a:ext uri="{FF2B5EF4-FFF2-40B4-BE49-F238E27FC236}">
+                <a16:creationId xmlns:a16="http://schemas.microsoft.com/office/drawing/2014/main" id="{C5D671BE-21FC-4BC4-834F-A5CAFACF0456}"/>
+              </a:ext>
+            </a:extLst>
+          </p:cNvPr>
+          <p:cNvPicPr>
+            <a:picLocks noChangeAspect="1"/>
+          </p:cNvPicPr>
+          <p:nvPr/>
+        </p:nvPicPr>
+        <p:blipFill>
+          <a:blip r:embed="rId3"/>
+          <a:stretch>
+            <a:fillRect/>
+          </a:stretch>
+        </p:blipFill>
+        <p:spPr>
+          <a:xfrm>
+            <a:off x="1039717" y="1708146"/>
+            <a:ext cx="10487885" cy="4222007"/>
+          </a:xfrm>
+          <a:prstGeom prst="rect">
+            <a:avLst/>
+          </a:prstGeom>
+        </p:spPr>
+      </p:pic>
+    </p:spTree>
+    <p:extLst>
+      <p:ext uri="{BB962C8B-B14F-4D97-AF65-F5344CB8AC3E}">
+        <p14:creationId xmlns:p14="http://schemas.microsoft.com/office/powerpoint/2010/main" val="499813717"/>
+      </p:ext>
+    </p:extLst>
+  </p:cSld>
+  <p:clrMapOvr>
+    <a:masterClrMapping/>
+  </p:clrMapOvr>
+</p:sld>
+</file>
+
+<file path=ppt/slides/slide22.xml><?xml version="1.0" encoding="utf-8"?>
+<p:sld xmlns:a="http://schemas.openxmlformats.org/drawingml/2006/main" xmlns:r="http://schemas.openxmlformats.org/officeDocument/2006/relationships" xmlns:p="http://schemas.openxmlformats.org/presentationml/2006/main">
+  <p:cSld>
+    <p:spTree>
+      <p:nvGrpSpPr>
+        <p:cNvPr id="1" name=""/>
+        <p:cNvGrpSpPr/>
+        <p:nvPr/>
+      </p:nvGrpSpPr>
+      <p:grpSpPr>
+        <a:xfrm>
+          <a:off x="0" y="0"/>
+          <a:ext cx="0" cy="0"/>
+          <a:chOff x="0" y="0"/>
+          <a:chExt cx="0" cy="0"/>
+        </a:xfrm>
+      </p:grpSpPr>
+      <p:pic>
+        <p:nvPicPr>
+          <p:cNvPr id="4" name="Picture 3" descr="강의 항공 사진">
+            <a:extLst>
+              <a:ext uri="{FF2B5EF4-FFF2-40B4-BE49-F238E27FC236}">
+                <a16:creationId xmlns:a16="http://schemas.microsoft.com/office/drawing/2014/main" id="{51D8E78A-5FBA-4684-91F9-26308D1DC1C8}"/>
+              </a:ext>
+            </a:extLst>
+          </p:cNvPr>
+          <p:cNvPicPr>
+            <a:picLocks noChangeAspect="1"/>
+          </p:cNvPicPr>
+          <p:nvPr/>
+        </p:nvPicPr>
+        <p:blipFill rotWithShape="1">
+          <a:blip r:embed="rId2">
+            <a:duotone>
+              <a:schemeClr val="accent1">
+                <a:shade val="45000"/>
+                <a:satMod val="135000"/>
+              </a:schemeClr>
+              <a:prstClr val="white"/>
+            </a:duotone>
+            <a:alphaModFix amt="35000"/>
+          </a:blip>
+          <a:srcRect l="73"/>
+          <a:stretch/>
+        </p:blipFill>
+        <p:spPr>
+          <a:xfrm>
+            <a:off x="1" y="10"/>
+            <a:ext cx="12183122" cy="6857989"/>
+          </a:xfrm>
+          <a:prstGeom prst="rect">
+            <a:avLst/>
+          </a:prstGeom>
+        </p:spPr>
+      </p:pic>
+      <p:sp>
+        <p:nvSpPr>
+          <p:cNvPr id="5" name="제목 1">
+            <a:extLst>
+              <a:ext uri="{FF2B5EF4-FFF2-40B4-BE49-F238E27FC236}">
+                <a16:creationId xmlns:a16="http://schemas.microsoft.com/office/drawing/2014/main" id="{51702DA7-ABB5-4108-8A07-6B2E47894A6E}"/>
+              </a:ext>
+            </a:extLst>
+          </p:cNvPr>
+          <p:cNvSpPr>
+            <a:spLocks noGrp="1"/>
+          </p:cNvSpPr>
+          <p:nvPr>
+            <p:ph type="ctrTitle"/>
+          </p:nvPr>
+        </p:nvSpPr>
+        <p:spPr>
+          <a:xfrm>
+            <a:off x="8877" y="-270052"/>
+            <a:ext cx="9430958" cy="1167841"/>
+          </a:xfrm>
+        </p:spPr>
+        <p:txBody>
+          <a:bodyPr anchor="b">
+            <a:normAutofit/>
+          </a:bodyPr>
+          <a:lstStyle/>
+          <a:p>
+            <a:r>
+              <a:rPr lang="en-US" altLang="ko-KR" sz="4800" dirty="0">
+                <a:solidFill>
+                  <a:schemeClr val="tx1">
+                    <a:lumMod val="75000"/>
+                    <a:lumOff val="25000"/>
+                  </a:schemeClr>
+                </a:solidFill>
+                <a:latin typeface="08서울남산체 EB" panose="02020603020101020101" pitchFamily="18" charset="-127"/>
+                <a:ea typeface="08서울남산체 EB" panose="02020603020101020101" pitchFamily="18" charset="-127"/>
+              </a:rPr>
+              <a:t>Array Basic (01)</a:t>
+            </a:r>
+            <a:endParaRPr lang="ko-KR" altLang="en-US" sz="4800" dirty="0">
+              <a:solidFill>
+                <a:schemeClr val="tx1">
+                  <a:lumMod val="75000"/>
+                  <a:lumOff val="25000"/>
+                </a:schemeClr>
+              </a:solidFill>
+              <a:latin typeface="08서울남산체 EB" panose="02020603020101020101" pitchFamily="18" charset="-127"/>
+              <a:ea typeface="08서울남산체 EB" panose="02020603020101020101" pitchFamily="18" charset="-127"/>
+            </a:endParaRPr>
+          </a:p>
+        </p:txBody>
+      </p:sp>
+      <p:sp>
+        <p:nvSpPr>
+          <p:cNvPr id="6" name="제목 1">
+            <a:extLst>
+              <a:ext uri="{FF2B5EF4-FFF2-40B4-BE49-F238E27FC236}">
+                <a16:creationId xmlns:a16="http://schemas.microsoft.com/office/drawing/2014/main" id="{9F4EC6B0-B381-4838-A787-D6F8E36BDC5A}"/>
+              </a:ext>
+            </a:extLst>
+          </p:cNvPr>
+          <p:cNvSpPr txBox="1">
+            <a:spLocks/>
+          </p:cNvSpPr>
+          <p:nvPr/>
+        </p:nvSpPr>
+        <p:spPr>
+          <a:xfrm>
+            <a:off x="-46395" y="-281086"/>
+            <a:ext cx="9430958" cy="1167841"/>
+          </a:xfrm>
+          <a:prstGeom prst="rect">
+            <a:avLst/>
+          </a:prstGeom>
+        </p:spPr>
+        <p:txBody>
+          <a:bodyPr lIns="109728" tIns="109728" rIns="109728" bIns="91440" anchor="b">
+            <a:normAutofit/>
+          </a:bodyPr>
+          <a:lstStyle>
+            <a:lvl1pPr algn="l" defTabSz="914400" rtl="0" eaLnBrk="1" latinLnBrk="0" hangingPunct="1">
+              <a:lnSpc>
+                <a:spcPct val="110000"/>
+              </a:lnSpc>
+              <a:spcBef>
+                <a:spcPct val="0"/>
+              </a:spcBef>
+              <a:buNone/>
+              <a:defRPr sz="6000" b="0" i="0" kern="1200" cap="none" spc="130" baseline="0">
+                <a:solidFill>
+                  <a:schemeClr val="tx1"/>
+                </a:solidFill>
+                <a:latin typeface="+mj-lt"/>
+                <a:ea typeface="+mj-ea"/>
+                <a:cs typeface="+mj-cs"/>
+              </a:defRPr>
+            </a:lvl1pPr>
+          </a:lstStyle>
+          <a:p>
+            <a:r>
+              <a:rPr lang="en-US" altLang="ko-KR" sz="4800" dirty="0">
+                <a:solidFill>
+                  <a:srgbClr val="FFFFFF"/>
+                </a:solidFill>
+                <a:latin typeface="08서울남산체 EB" panose="02020603020101020101" pitchFamily="18" charset="-127"/>
+                <a:ea typeface="08서울남산체 EB" panose="02020603020101020101" pitchFamily="18" charset="-127"/>
+              </a:rPr>
+              <a:t>Array</a:t>
+            </a:r>
+            <a:r>
+              <a:rPr lang="ko-KR" altLang="en-US" sz="4800" dirty="0">
+                <a:solidFill>
+                  <a:srgbClr val="FFFFFF"/>
+                </a:solidFill>
+                <a:latin typeface="08서울남산체 EB" panose="02020603020101020101" pitchFamily="18" charset="-127"/>
+                <a:ea typeface="08서울남산체 EB" panose="02020603020101020101" pitchFamily="18" charset="-127"/>
+              </a:rPr>
+              <a:t> </a:t>
+            </a:r>
+            <a:r>
+              <a:rPr lang="en-US" altLang="ko-KR" sz="4800" dirty="0">
+                <a:solidFill>
+                  <a:srgbClr val="FFFFFF"/>
+                </a:solidFill>
+                <a:latin typeface="08서울남산체 EB" panose="02020603020101020101" pitchFamily="18" charset="-127"/>
+                <a:ea typeface="08서울남산체 EB" panose="02020603020101020101" pitchFamily="18" charset="-127"/>
+              </a:rPr>
+              <a:t>Basic</a:t>
+            </a:r>
+            <a:r>
+              <a:rPr lang="ko-KR" altLang="en-US" sz="4800" dirty="0">
+                <a:solidFill>
+                  <a:srgbClr val="FFFFFF"/>
+                </a:solidFill>
+                <a:latin typeface="08서울남산체 EB" panose="02020603020101020101" pitchFamily="18" charset="-127"/>
+                <a:ea typeface="08서울남산체 EB" panose="02020603020101020101" pitchFamily="18" charset="-127"/>
+              </a:rPr>
+              <a:t> </a:t>
+            </a:r>
+            <a:r>
+              <a:rPr lang="en-US" altLang="ko-KR" sz="4800" dirty="0">
+                <a:solidFill>
+                  <a:srgbClr val="FFFFFF"/>
+                </a:solidFill>
+                <a:latin typeface="08서울남산체 EB" panose="02020603020101020101" pitchFamily="18" charset="-127"/>
+                <a:ea typeface="08서울남산체 EB" panose="02020603020101020101" pitchFamily="18" charset="-127"/>
+              </a:rPr>
+              <a:t>(01)</a:t>
+            </a:r>
+            <a:endParaRPr lang="ko-KR" altLang="en-US" sz="4800" dirty="0">
+              <a:solidFill>
+                <a:srgbClr val="FFFFFF"/>
+              </a:solidFill>
+              <a:latin typeface="08서울남산체 EB" panose="02020603020101020101" pitchFamily="18" charset="-127"/>
+              <a:ea typeface="08서울남산체 EB" panose="02020603020101020101" pitchFamily="18" charset="-127"/>
+            </a:endParaRPr>
+          </a:p>
+        </p:txBody>
+      </p:sp>
+      <p:pic>
+        <p:nvPicPr>
+          <p:cNvPr id="7" name="그림 6">
+            <a:extLst>
+              <a:ext uri="{FF2B5EF4-FFF2-40B4-BE49-F238E27FC236}">
+                <a16:creationId xmlns:a16="http://schemas.microsoft.com/office/drawing/2014/main" id="{26C61C6F-435F-40F5-B338-E76D86DE75E0}"/>
+              </a:ext>
+            </a:extLst>
+          </p:cNvPr>
+          <p:cNvPicPr>
+            <a:picLocks noChangeAspect="1"/>
+          </p:cNvPicPr>
+          <p:nvPr/>
+        </p:nvPicPr>
+        <p:blipFill>
+          <a:blip r:embed="rId3"/>
+          <a:stretch>
+            <a:fillRect/>
+          </a:stretch>
+        </p:blipFill>
+        <p:spPr>
+          <a:xfrm>
+            <a:off x="2532448" y="1116636"/>
+            <a:ext cx="7118228" cy="5500448"/>
+          </a:xfrm>
+          <a:prstGeom prst="rect">
+            <a:avLst/>
+          </a:prstGeom>
+        </p:spPr>
+      </p:pic>
+    </p:spTree>
+    <p:extLst>
+      <p:ext uri="{BB962C8B-B14F-4D97-AF65-F5344CB8AC3E}">
+        <p14:creationId xmlns:p14="http://schemas.microsoft.com/office/powerpoint/2010/main" val="2920251770"/>
+      </p:ext>
+    </p:extLst>
+  </p:cSld>
+  <p:clrMapOvr>
+    <a:masterClrMapping/>
+  </p:clrMapOvr>
+</p:sld>
+</file>
+
+<file path=ppt/slides/slide23.xml><?xml version="1.0" encoding="utf-8"?>
+<p:sld xmlns:a="http://schemas.openxmlformats.org/drawingml/2006/main" xmlns:r="http://schemas.openxmlformats.org/officeDocument/2006/relationships" xmlns:p="http://schemas.openxmlformats.org/presentationml/2006/main">
+  <p:cSld>
+    <p:spTree>
+      <p:nvGrpSpPr>
+        <p:cNvPr id="1" name=""/>
+        <p:cNvGrpSpPr/>
+        <p:nvPr/>
+      </p:nvGrpSpPr>
+      <p:grpSpPr>
+        <a:xfrm>
+          <a:off x="0" y="0"/>
+          <a:ext cx="0" cy="0"/>
+          <a:chOff x="0" y="0"/>
+          <a:chExt cx="0" cy="0"/>
+        </a:xfrm>
+      </p:grpSpPr>
+      <p:pic>
+        <p:nvPicPr>
+          <p:cNvPr id="4" name="Picture 3" descr="강의 항공 사진">
+            <a:extLst>
+              <a:ext uri="{FF2B5EF4-FFF2-40B4-BE49-F238E27FC236}">
+                <a16:creationId xmlns:a16="http://schemas.microsoft.com/office/drawing/2014/main" id="{51D8E78A-5FBA-4684-91F9-26308D1DC1C8}"/>
+              </a:ext>
+            </a:extLst>
+          </p:cNvPr>
+          <p:cNvPicPr>
+            <a:picLocks noChangeAspect="1"/>
+          </p:cNvPicPr>
+          <p:nvPr/>
+        </p:nvPicPr>
+        <p:blipFill rotWithShape="1">
+          <a:blip r:embed="rId2">
+            <a:duotone>
+              <a:schemeClr val="accent1">
+                <a:shade val="45000"/>
+                <a:satMod val="135000"/>
+              </a:schemeClr>
+              <a:prstClr val="white"/>
+            </a:duotone>
+            <a:alphaModFix amt="35000"/>
+          </a:blip>
+          <a:srcRect l="73"/>
+          <a:stretch/>
+        </p:blipFill>
+        <p:spPr>
+          <a:xfrm>
+            <a:off x="1" y="10"/>
+            <a:ext cx="12183122" cy="6857989"/>
+          </a:xfrm>
+          <a:prstGeom prst="rect">
+            <a:avLst/>
+          </a:prstGeom>
+        </p:spPr>
+      </p:pic>
+      <p:sp>
+        <p:nvSpPr>
+          <p:cNvPr id="5" name="제목 1">
+            <a:extLst>
+              <a:ext uri="{FF2B5EF4-FFF2-40B4-BE49-F238E27FC236}">
+                <a16:creationId xmlns:a16="http://schemas.microsoft.com/office/drawing/2014/main" id="{51702DA7-ABB5-4108-8A07-6B2E47894A6E}"/>
+              </a:ext>
+            </a:extLst>
+          </p:cNvPr>
+          <p:cNvSpPr>
+            <a:spLocks noGrp="1"/>
+          </p:cNvSpPr>
+          <p:nvPr>
+            <p:ph type="ctrTitle"/>
+          </p:nvPr>
+        </p:nvSpPr>
+        <p:spPr>
+          <a:xfrm>
+            <a:off x="168534" y="-105410"/>
+            <a:ext cx="9430958" cy="1167841"/>
+          </a:xfrm>
+        </p:spPr>
+        <p:txBody>
+          <a:bodyPr anchor="b">
+            <a:normAutofit/>
+          </a:bodyPr>
+          <a:lstStyle/>
+          <a:p>
+            <a:r>
+              <a:rPr lang="en-US" altLang="ko-KR" sz="5400" dirty="0">
+                <a:solidFill>
+                  <a:schemeClr val="tx1">
+                    <a:lumMod val="75000"/>
+                    <a:lumOff val="25000"/>
+                  </a:schemeClr>
+                </a:solidFill>
+                <a:latin typeface="08서울남산체 EB" panose="02020603020101020101" pitchFamily="18" charset="-127"/>
+                <a:ea typeface="08서울남산체 EB" panose="02020603020101020101" pitchFamily="18" charset="-127"/>
+              </a:rPr>
+              <a:t>Assignment</a:t>
+            </a:r>
+            <a:endParaRPr lang="ko-KR" altLang="en-US" sz="5400" dirty="0">
+              <a:solidFill>
+                <a:schemeClr val="tx1">
+                  <a:lumMod val="75000"/>
+                  <a:lumOff val="25000"/>
+                </a:schemeClr>
+              </a:solidFill>
+              <a:latin typeface="08서울남산체 EB" panose="02020603020101020101" pitchFamily="18" charset="-127"/>
+              <a:ea typeface="08서울남산체 EB" panose="02020603020101020101" pitchFamily="18" charset="-127"/>
+            </a:endParaRPr>
+          </a:p>
+        </p:txBody>
+      </p:sp>
+      <p:sp>
+        <p:nvSpPr>
+          <p:cNvPr id="6" name="부제목 2">
+            <a:extLst>
+              <a:ext uri="{FF2B5EF4-FFF2-40B4-BE49-F238E27FC236}">
+                <a16:creationId xmlns:a16="http://schemas.microsoft.com/office/drawing/2014/main" id="{CD7C2ABE-3ECC-4B23-A809-B01C9C72A61D}"/>
+              </a:ext>
+            </a:extLst>
+          </p:cNvPr>
+          <p:cNvSpPr>
+            <a:spLocks noGrp="1"/>
+          </p:cNvSpPr>
+          <p:nvPr>
+            <p:ph type="subTitle" idx="1"/>
+          </p:nvPr>
+        </p:nvSpPr>
+        <p:spPr>
+          <a:xfrm>
+            <a:off x="766610" y="1217104"/>
+            <a:ext cx="10838202" cy="4560607"/>
+          </a:xfrm>
+        </p:spPr>
+        <p:txBody>
+          <a:bodyPr anchor="ctr">
+            <a:normAutofit fontScale="70000" lnSpcReduction="20000"/>
+          </a:bodyPr>
+          <a:lstStyle/>
+          <a:p>
+            <a:r>
+              <a:rPr lang="en-US" altLang="ko-KR" sz="3600" dirty="0">
+                <a:effectLst>
+                  <a:outerShdw blurRad="38100" dist="38100" dir="2700000" algn="tl">
+                    <a:srgbClr val="000000">
+                      <a:alpha val="43137"/>
+                    </a:srgbClr>
+                  </a:outerShdw>
+                </a:effectLst>
+              </a:rPr>
+              <a:t>Q. Palindrome(</a:t>
+            </a:r>
+            <a:r>
+              <a:rPr lang="ko-KR" altLang="en-US" sz="3600" dirty="0">
+                <a:effectLst>
+                  <a:outerShdw blurRad="38100" dist="38100" dir="2700000" algn="tl">
+                    <a:srgbClr val="000000">
+                      <a:alpha val="43137"/>
+                    </a:srgbClr>
+                  </a:outerShdw>
+                </a:effectLst>
+              </a:rPr>
+              <a:t>회문</a:t>
+            </a:r>
+            <a:r>
+              <a:rPr lang="en-US" altLang="ko-KR" sz="3600" dirty="0">
+                <a:effectLst>
+                  <a:outerShdw blurRad="38100" dist="38100" dir="2700000" algn="tl">
+                    <a:srgbClr val="000000">
+                      <a:alpha val="43137"/>
+                    </a:srgbClr>
+                  </a:outerShdw>
+                </a:effectLst>
+              </a:rPr>
+              <a:t>)</a:t>
+            </a:r>
+            <a:r>
+              <a:rPr lang="ko-KR" altLang="en-US" sz="3600" dirty="0">
+                <a:effectLst>
+                  <a:outerShdw blurRad="38100" dist="38100" dir="2700000" algn="tl">
+                    <a:srgbClr val="000000">
+                      <a:alpha val="43137"/>
+                    </a:srgbClr>
+                  </a:outerShdw>
+                </a:effectLst>
+              </a:rPr>
+              <a:t>여부를 검출</a:t>
+            </a:r>
+            <a:endParaRPr lang="en-US" altLang="ko-KR" sz="3600" dirty="0">
+              <a:effectLst>
+                <a:outerShdw blurRad="38100" dist="38100" dir="2700000" algn="tl">
+                  <a:srgbClr val="000000">
+                    <a:alpha val="43137"/>
+                  </a:srgbClr>
+                </a:outerShdw>
+              </a:effectLst>
+            </a:endParaRPr>
+          </a:p>
+          <a:p>
+            <a:r>
+              <a:rPr lang="en-US" altLang="ko-KR" sz="1500" dirty="0">
+                <a:effectLst>
+                  <a:outerShdw blurRad="38100" dist="38100" dir="2700000" algn="tl">
+                    <a:srgbClr val="000000">
+                      <a:alpha val="43137"/>
+                    </a:srgbClr>
+                  </a:outerShdw>
+                </a:effectLst>
+              </a:rPr>
+              <a:t>Palindrome</a:t>
+            </a:r>
+            <a:r>
+              <a:rPr lang="ko-KR" altLang="en-US" sz="1500" dirty="0">
+                <a:effectLst>
+                  <a:outerShdw blurRad="38100" dist="38100" dir="2700000" algn="tl">
+                    <a:srgbClr val="000000">
+                      <a:alpha val="43137"/>
+                    </a:srgbClr>
+                  </a:outerShdw>
+                </a:effectLst>
+              </a:rPr>
+              <a:t>은 회문이라 불리며 정방향에서 읽는 것과 역방향에서 읽는 것이 동일한 낱말</a:t>
+            </a:r>
+            <a:r>
+              <a:rPr lang="en-US" altLang="ko-KR" sz="1500" dirty="0">
+                <a:effectLst>
+                  <a:outerShdw blurRad="38100" dist="38100" dir="2700000" algn="tl">
+                    <a:srgbClr val="000000">
+                      <a:alpha val="43137"/>
+                    </a:srgbClr>
+                  </a:outerShdw>
+                </a:effectLst>
+              </a:rPr>
+              <a:t>, </a:t>
+            </a:r>
+            <a:r>
+              <a:rPr lang="ko-KR" altLang="en-US" sz="1500" dirty="0">
+                <a:effectLst>
+                  <a:outerShdw blurRad="38100" dist="38100" dir="2700000" algn="tl">
+                    <a:srgbClr val="000000">
+                      <a:alpha val="43137"/>
+                    </a:srgbClr>
+                  </a:outerShdw>
+                </a:effectLst>
+              </a:rPr>
+              <a:t>숫자</a:t>
+            </a:r>
+            <a:r>
+              <a:rPr lang="en-US" altLang="ko-KR" sz="1500" dirty="0">
+                <a:effectLst>
+                  <a:outerShdw blurRad="38100" dist="38100" dir="2700000" algn="tl">
+                    <a:srgbClr val="000000">
+                      <a:alpha val="43137"/>
+                    </a:srgbClr>
+                  </a:outerShdw>
+                </a:effectLst>
+              </a:rPr>
+              <a:t>, </a:t>
+            </a:r>
+            <a:r>
+              <a:rPr lang="ko-KR" altLang="en-US" sz="1500" dirty="0">
+                <a:effectLst>
+                  <a:outerShdw blurRad="38100" dist="38100" dir="2700000" algn="tl">
+                    <a:srgbClr val="000000">
+                      <a:alpha val="43137"/>
+                    </a:srgbClr>
+                  </a:outerShdw>
+                </a:effectLst>
+              </a:rPr>
+              <a:t>문자열을 뜻한다</a:t>
+            </a:r>
+            <a:r>
+              <a:rPr lang="en-US" altLang="ko-KR" sz="1500" dirty="0">
+                <a:effectLst>
+                  <a:outerShdw blurRad="38100" dist="38100" dir="2700000" algn="tl">
+                    <a:srgbClr val="000000">
+                      <a:alpha val="43137"/>
+                    </a:srgbClr>
+                  </a:outerShdw>
+                </a:effectLst>
+              </a:rPr>
+              <a:t>. </a:t>
+            </a:r>
+          </a:p>
+          <a:p>
+            <a:r>
+              <a:rPr lang="ko-KR" altLang="en-US" sz="1500" dirty="0">
+                <a:effectLst>
+                  <a:outerShdw blurRad="38100" dist="38100" dir="2700000" algn="tl">
+                    <a:srgbClr val="000000">
+                      <a:alpha val="43137"/>
+                    </a:srgbClr>
+                  </a:outerShdw>
+                </a:effectLst>
+              </a:rPr>
+              <a:t>검출하기 위해 사용되는 낱말</a:t>
+            </a:r>
+            <a:r>
+              <a:rPr lang="en-US" altLang="ko-KR" sz="1500" dirty="0">
+                <a:effectLst>
+                  <a:outerShdw blurRad="38100" dist="38100" dir="2700000" algn="tl">
+                    <a:srgbClr val="000000">
+                      <a:alpha val="43137"/>
+                    </a:srgbClr>
+                  </a:outerShdw>
+                </a:effectLst>
+              </a:rPr>
+              <a:t>, </a:t>
+            </a:r>
+            <a:r>
+              <a:rPr lang="ko-KR" altLang="en-US" sz="1500" dirty="0">
+                <a:effectLst>
+                  <a:outerShdw blurRad="38100" dist="38100" dir="2700000" algn="tl">
+                    <a:srgbClr val="000000">
+                      <a:alpha val="43137"/>
+                    </a:srgbClr>
+                  </a:outerShdw>
+                </a:effectLst>
+              </a:rPr>
+              <a:t>숫자</a:t>
+            </a:r>
+            <a:r>
+              <a:rPr lang="en-US" altLang="ko-KR" sz="1500" dirty="0">
+                <a:effectLst>
+                  <a:outerShdw blurRad="38100" dist="38100" dir="2700000" algn="tl">
+                    <a:srgbClr val="000000">
+                      <a:alpha val="43137"/>
+                    </a:srgbClr>
+                  </a:outerShdw>
+                </a:effectLst>
+              </a:rPr>
+              <a:t>, </a:t>
+            </a:r>
+            <a:r>
+              <a:rPr lang="ko-KR" altLang="en-US" sz="1500" dirty="0">
+                <a:effectLst>
+                  <a:outerShdw blurRad="38100" dist="38100" dir="2700000" algn="tl">
+                    <a:srgbClr val="000000">
+                      <a:alpha val="43137"/>
+                    </a:srgbClr>
+                  </a:outerShdw>
+                </a:effectLst>
+              </a:rPr>
+              <a:t>문자열의 모음을 </a:t>
+            </a:r>
+            <a:r>
+              <a:rPr lang="en-US" altLang="ko-KR" sz="1500" dirty="0">
+                <a:effectLst>
+                  <a:outerShdw blurRad="38100" dist="38100" dir="2700000" algn="tl">
+                    <a:srgbClr val="000000">
+                      <a:alpha val="43137"/>
+                    </a:srgbClr>
+                  </a:outerShdw>
+                </a:effectLst>
+              </a:rPr>
+              <a:t>‘</a:t>
+            </a:r>
+            <a:r>
+              <a:rPr lang="ko-KR" altLang="en-US" sz="1500" dirty="0">
+                <a:effectLst>
+                  <a:outerShdw blurRad="38100" dist="38100" dir="2700000" algn="tl">
+                    <a:srgbClr val="000000">
+                      <a:alpha val="43137"/>
+                    </a:srgbClr>
+                  </a:outerShdw>
+                </a:effectLst>
+              </a:rPr>
+              <a:t>구문</a:t>
+            </a:r>
+            <a:r>
+              <a:rPr lang="en-US" altLang="ko-KR" sz="1500" dirty="0">
+                <a:effectLst>
+                  <a:outerShdw blurRad="38100" dist="38100" dir="2700000" algn="tl">
+                    <a:srgbClr val="000000">
+                      <a:alpha val="43137"/>
+                    </a:srgbClr>
+                  </a:outerShdw>
+                </a:effectLst>
+              </a:rPr>
+              <a:t>＇</a:t>
+            </a:r>
+            <a:r>
+              <a:rPr lang="ko-KR" altLang="en-US" sz="1500" dirty="0">
+                <a:effectLst>
+                  <a:outerShdw blurRad="38100" dist="38100" dir="2700000" algn="tl">
+                    <a:srgbClr val="000000">
+                      <a:alpha val="43137"/>
+                    </a:srgbClr>
+                  </a:outerShdw>
+                </a:effectLst>
+              </a:rPr>
+              <a:t>이라고 칭하고 </a:t>
+            </a:r>
+            <a:endParaRPr lang="en-US" altLang="ko-KR" sz="1500" dirty="0">
+              <a:effectLst>
+                <a:outerShdw blurRad="38100" dist="38100" dir="2700000" algn="tl">
+                  <a:srgbClr val="000000">
+                    <a:alpha val="43137"/>
+                  </a:srgbClr>
+                </a:outerShdw>
+              </a:effectLst>
+            </a:endParaRPr>
+          </a:p>
+          <a:p>
+            <a:r>
+              <a:rPr lang="ko-KR" altLang="en-US" sz="1500" dirty="0">
+                <a:effectLst>
+                  <a:outerShdw blurRad="38100" dist="38100" dir="2700000" algn="tl">
+                    <a:srgbClr val="000000">
+                      <a:alpha val="43137"/>
+                    </a:srgbClr>
+                  </a:outerShdw>
+                </a:effectLst>
+              </a:rPr>
+              <a:t>구문사이에 속해 있는 띄어쓰기나 특수문자</a:t>
+            </a:r>
+            <a:r>
+              <a:rPr lang="en-US" altLang="ko-KR" sz="1500" dirty="0">
+                <a:effectLst>
+                  <a:outerShdw blurRad="38100" dist="38100" dir="2700000" algn="tl">
+                    <a:srgbClr val="000000">
+                      <a:alpha val="43137"/>
+                    </a:srgbClr>
+                  </a:outerShdw>
+                </a:effectLst>
+              </a:rPr>
+              <a:t>, </a:t>
+            </a:r>
+            <a:r>
+              <a:rPr lang="ko-KR" altLang="en-US" sz="1500" dirty="0">
+                <a:effectLst>
+                  <a:outerShdw blurRad="38100" dist="38100" dir="2700000" algn="tl">
+                    <a:srgbClr val="000000">
+                      <a:alpha val="43137"/>
+                    </a:srgbClr>
+                  </a:outerShdw>
+                </a:effectLst>
+              </a:rPr>
+              <a:t>문장부호는 무시한다</a:t>
+            </a:r>
+            <a:r>
+              <a:rPr lang="en-US" altLang="ko-KR" sz="1500" dirty="0">
+                <a:effectLst>
+                  <a:outerShdw blurRad="38100" dist="38100" dir="2700000" algn="tl">
+                    <a:srgbClr val="000000">
+                      <a:alpha val="43137"/>
+                    </a:srgbClr>
+                  </a:outerShdw>
+                </a:effectLst>
+              </a:rPr>
+              <a:t>. </a:t>
+            </a:r>
+          </a:p>
+          <a:p>
+            <a:r>
+              <a:rPr lang="ko-KR" altLang="en-US" sz="1500" dirty="0">
+                <a:effectLst>
+                  <a:outerShdw blurRad="38100" dist="38100" dir="2700000" algn="tl">
+                    <a:srgbClr val="000000">
+                      <a:alpha val="43137"/>
+                    </a:srgbClr>
+                  </a:outerShdw>
+                </a:effectLst>
+              </a:rPr>
+              <a:t>하나의 문자열을 입력 받아서 그 문자열이 회문인지 아닌지 검출하는 프로그램을 </a:t>
+            </a:r>
+            <a:r>
+              <a:rPr lang="ko-KR" altLang="en-US" sz="1500" dirty="0" err="1">
+                <a:effectLst>
+                  <a:outerShdw blurRad="38100" dist="38100" dir="2700000" algn="tl">
+                    <a:srgbClr val="000000">
+                      <a:alpha val="43137"/>
+                    </a:srgbClr>
+                  </a:outerShdw>
+                </a:effectLst>
+              </a:rPr>
+              <a:t>작성하시오</a:t>
+            </a:r>
+            <a:r>
+              <a:rPr lang="en-US" altLang="ko-KR" sz="1500" dirty="0">
+                <a:effectLst>
+                  <a:outerShdw blurRad="38100" dist="38100" dir="2700000" algn="tl">
+                    <a:srgbClr val="000000">
+                      <a:alpha val="43137"/>
+                    </a:srgbClr>
+                  </a:outerShdw>
+                </a:effectLst>
+              </a:rPr>
+              <a:t>.</a:t>
+            </a:r>
+          </a:p>
+          <a:p>
+            <a:r>
+              <a:rPr lang="en-US" altLang="ko-KR" sz="1500" dirty="0">
+                <a:effectLst>
+                  <a:outerShdw blurRad="38100" dist="38100" dir="2700000" algn="tl">
+                    <a:srgbClr val="000000">
+                      <a:alpha val="43137"/>
+                    </a:srgbClr>
+                  </a:outerShdw>
+                </a:effectLst>
+              </a:rPr>
+              <a:t>(</a:t>
+            </a:r>
+            <a:r>
+              <a:rPr lang="ko-KR" altLang="en-US" sz="1500" dirty="0">
+                <a:effectLst>
+                  <a:outerShdw blurRad="38100" dist="38100" dir="2700000" algn="tl">
+                    <a:srgbClr val="000000">
+                      <a:alpha val="43137"/>
+                    </a:srgbClr>
+                  </a:outerShdw>
+                </a:effectLst>
+              </a:rPr>
+              <a:t>단</a:t>
+            </a:r>
+            <a:r>
+              <a:rPr lang="en-US" altLang="ko-KR" sz="1500" dirty="0">
+                <a:effectLst>
+                  <a:outerShdw blurRad="38100" dist="38100" dir="2700000" algn="tl">
+                    <a:srgbClr val="000000">
+                      <a:alpha val="43137"/>
+                    </a:srgbClr>
+                  </a:outerShdw>
+                </a:effectLst>
+              </a:rPr>
+              <a:t>, </a:t>
+            </a:r>
+            <a:r>
+              <a:rPr lang="ko-KR" altLang="en-US" sz="1500" dirty="0">
+                <a:effectLst>
+                  <a:outerShdw blurRad="38100" dist="38100" dir="2700000" algn="tl">
+                    <a:srgbClr val="000000">
+                      <a:alpha val="43137"/>
+                    </a:srgbClr>
+                  </a:outerShdw>
+                </a:effectLst>
+              </a:rPr>
+              <a:t>문자열 입력 시</a:t>
+            </a:r>
+            <a:r>
+              <a:rPr lang="en-US" altLang="ko-KR" sz="1500" dirty="0">
+                <a:effectLst>
+                  <a:outerShdw blurRad="38100" dist="38100" dir="2700000" algn="tl">
+                    <a:srgbClr val="000000">
+                      <a:alpha val="43137"/>
+                    </a:srgbClr>
+                  </a:outerShdw>
+                </a:effectLst>
+              </a:rPr>
+              <a:t>, </a:t>
+            </a:r>
+            <a:r>
+              <a:rPr lang="ko-KR" altLang="en-US" sz="1500" dirty="0">
+                <a:effectLst>
+                  <a:outerShdw blurRad="38100" dist="38100" dir="2700000" algn="tl">
+                    <a:srgbClr val="000000">
+                      <a:alpha val="43137"/>
+                    </a:srgbClr>
+                  </a:outerShdw>
+                </a:effectLst>
+              </a:rPr>
+              <a:t>소문자로 된 알파벳 </a:t>
+            </a:r>
+            <a:r>
+              <a:rPr lang="en-US" altLang="ko-KR" sz="1500" dirty="0" err="1">
+                <a:effectLst>
+                  <a:outerShdw blurRad="38100" dist="38100" dir="2700000" algn="tl">
+                    <a:srgbClr val="000000">
+                      <a:alpha val="43137"/>
+                    </a:srgbClr>
+                  </a:outerShdw>
+                </a:effectLst>
+              </a:rPr>
+              <a:t>a~z</a:t>
+            </a:r>
+            <a:r>
+              <a:rPr lang="ko-KR" altLang="en-US" sz="1500" dirty="0">
+                <a:effectLst>
+                  <a:outerShdw blurRad="38100" dist="38100" dir="2700000" algn="tl">
+                    <a:srgbClr val="000000">
+                      <a:alpha val="43137"/>
+                    </a:srgbClr>
+                  </a:outerShdw>
+                </a:effectLst>
+              </a:rPr>
+              <a:t>로만 이루어진 </a:t>
+            </a:r>
+            <a:r>
+              <a:rPr lang="en-US" altLang="ko-KR" sz="1500" dirty="0">
+                <a:effectLst>
+                  <a:outerShdw blurRad="38100" dist="38100" dir="2700000" algn="tl">
+                    <a:srgbClr val="000000">
+                      <a:alpha val="43137"/>
+                    </a:srgbClr>
+                  </a:outerShdw>
+                </a:effectLst>
+              </a:rPr>
+              <a:t>7</a:t>
+            </a:r>
+            <a:r>
+              <a:rPr lang="ko-KR" altLang="en-US" sz="1500" dirty="0">
+                <a:effectLst>
+                  <a:outerShdw blurRad="38100" dist="38100" dir="2700000" algn="tl">
+                    <a:srgbClr val="000000">
+                      <a:alpha val="43137"/>
+                    </a:srgbClr>
+                  </a:outerShdw>
+                </a:effectLst>
+              </a:rPr>
+              <a:t>자의 문자열이 입력되며</a:t>
+            </a:r>
+            <a:r>
+              <a:rPr lang="en-US" altLang="ko-KR" sz="1500" dirty="0">
+                <a:effectLst>
+                  <a:outerShdw blurRad="38100" dist="38100" dir="2700000" algn="tl">
+                    <a:srgbClr val="000000">
+                      <a:alpha val="43137"/>
+                    </a:srgbClr>
+                  </a:outerShdw>
+                </a:effectLst>
+              </a:rPr>
+              <a:t>, </a:t>
+            </a:r>
+          </a:p>
+          <a:p>
+            <a:r>
+              <a:rPr lang="ko-KR" altLang="en-US" sz="1500" dirty="0">
+                <a:effectLst>
+                  <a:outerShdw blurRad="38100" dist="38100" dir="2700000" algn="tl">
+                    <a:srgbClr val="000000">
+                      <a:alpha val="43137"/>
+                    </a:srgbClr>
+                  </a:outerShdw>
+                </a:effectLst>
+              </a:rPr>
+              <a:t>공백과 띄어쓰기</a:t>
+            </a:r>
+            <a:r>
+              <a:rPr lang="en-US" altLang="ko-KR" sz="1500" dirty="0">
+                <a:effectLst>
+                  <a:outerShdw blurRad="38100" dist="38100" dir="2700000" algn="tl">
+                    <a:srgbClr val="000000">
+                      <a:alpha val="43137"/>
+                    </a:srgbClr>
+                  </a:outerShdw>
+                </a:effectLst>
+              </a:rPr>
+              <a:t>, </a:t>
+            </a:r>
+            <a:r>
+              <a:rPr lang="ko-KR" altLang="en-US" sz="1500" dirty="0">
+                <a:effectLst>
+                  <a:outerShdw blurRad="38100" dist="38100" dir="2700000" algn="tl">
+                    <a:srgbClr val="000000">
+                      <a:alpha val="43137"/>
+                    </a:srgbClr>
+                  </a:outerShdw>
+                </a:effectLst>
+              </a:rPr>
+              <a:t>특수문자</a:t>
+            </a:r>
+            <a:r>
+              <a:rPr lang="en-US" altLang="ko-KR" sz="1500" dirty="0">
+                <a:effectLst>
+                  <a:outerShdw blurRad="38100" dist="38100" dir="2700000" algn="tl">
+                    <a:srgbClr val="000000">
+                      <a:alpha val="43137"/>
+                    </a:srgbClr>
+                  </a:outerShdw>
+                </a:effectLst>
+              </a:rPr>
+              <a:t>, </a:t>
+            </a:r>
+            <a:r>
+              <a:rPr lang="ko-KR" altLang="en-US" sz="1500" dirty="0">
+                <a:effectLst>
+                  <a:outerShdw blurRad="38100" dist="38100" dir="2700000" algn="tl">
+                    <a:srgbClr val="000000">
+                      <a:alpha val="43137"/>
+                    </a:srgbClr>
+                  </a:outerShdw>
+                </a:effectLst>
+              </a:rPr>
+              <a:t>문장부호는 고려하지 않도록 한다</a:t>
+            </a:r>
+            <a:r>
+              <a:rPr lang="en-US" altLang="ko-KR" sz="1500" dirty="0">
+                <a:effectLst>
+                  <a:outerShdw blurRad="38100" dist="38100" dir="2700000" algn="tl">
+                    <a:srgbClr val="000000">
+                      <a:alpha val="43137"/>
+                    </a:srgbClr>
+                  </a:outerShdw>
+                </a:effectLst>
+              </a:rPr>
+              <a:t>.)</a:t>
+            </a:r>
+            <a:r>
+              <a:rPr lang="ko-KR" altLang="en-US" sz="1500" dirty="0">
+                <a:effectLst>
+                  <a:outerShdw blurRad="38100" dist="38100" dir="2700000" algn="tl">
+                    <a:srgbClr val="000000">
+                      <a:alpha val="43137"/>
+                    </a:srgbClr>
+                  </a:outerShdw>
+                </a:effectLst>
+              </a:rPr>
+              <a:t> </a:t>
+            </a:r>
+            <a:endParaRPr lang="en-US" altLang="ko-KR" sz="1500" dirty="0">
+              <a:effectLst>
+                <a:outerShdw blurRad="38100" dist="38100" dir="2700000" algn="tl">
+                  <a:srgbClr val="000000">
+                    <a:alpha val="43137"/>
+                  </a:srgbClr>
+                </a:outerShdw>
+              </a:effectLst>
+            </a:endParaRPr>
+          </a:p>
+          <a:p>
+            <a:endParaRPr lang="en-US" altLang="ko-KR" sz="1500" dirty="0">
+              <a:effectLst>
+                <a:outerShdw blurRad="38100" dist="38100" dir="2700000" algn="tl">
+                  <a:srgbClr val="000000">
+                    <a:alpha val="43137"/>
+                  </a:srgbClr>
+                </a:outerShdw>
+              </a:effectLst>
+            </a:endParaRPr>
+          </a:p>
+          <a:p>
+            <a:r>
+              <a:rPr lang="ko-KR" altLang="en-US" sz="1500" b="1" dirty="0">
+                <a:effectLst>
+                  <a:outerShdw blurRad="38100" dist="38100" dir="2700000" algn="tl">
+                    <a:srgbClr val="000000">
+                      <a:alpha val="43137"/>
+                    </a:srgbClr>
+                  </a:outerShdw>
+                </a:effectLst>
+              </a:rPr>
+              <a:t>💻예시 </a:t>
+            </a:r>
+            <a:r>
+              <a:rPr lang="en-US" altLang="ko-KR" sz="1500" b="1" dirty="0">
+                <a:effectLst>
+                  <a:outerShdw blurRad="38100" dist="38100" dir="2700000" algn="tl">
+                    <a:srgbClr val="000000">
+                      <a:alpha val="43137"/>
+                    </a:srgbClr>
+                  </a:outerShdw>
+                </a:effectLst>
+              </a:rPr>
+              <a:t>01</a:t>
+            </a:r>
+          </a:p>
+          <a:p>
+            <a:r>
+              <a:rPr lang="ko-KR" altLang="en-US" sz="1500" dirty="0">
+                <a:effectLst>
+                  <a:outerShdw blurRad="38100" dist="38100" dir="2700000" algn="tl">
+                    <a:srgbClr val="000000">
+                      <a:alpha val="43137"/>
+                    </a:srgbClr>
+                  </a:outerShdw>
+                </a:effectLst>
+              </a:rPr>
+              <a:t>입력 </a:t>
+            </a:r>
+            <a:r>
+              <a:rPr lang="en-US" altLang="ko-KR" sz="1500" dirty="0">
+                <a:effectLst>
+                  <a:outerShdw blurRad="38100" dist="38100" dir="2700000" algn="tl">
+                    <a:srgbClr val="000000">
+                      <a:alpha val="43137"/>
+                    </a:srgbClr>
+                  </a:outerShdw>
+                </a:effectLst>
+              </a:rPr>
+              <a:t>: racecar</a:t>
+            </a:r>
+          </a:p>
+          <a:p>
+            <a:r>
+              <a:rPr lang="ko-KR" altLang="en-US" sz="1500" dirty="0">
+                <a:effectLst>
+                  <a:outerShdw blurRad="38100" dist="38100" dir="2700000" algn="tl">
+                    <a:srgbClr val="000000">
+                      <a:alpha val="43137"/>
+                    </a:srgbClr>
+                  </a:outerShdw>
+                </a:effectLst>
+              </a:rPr>
+              <a:t>출력 </a:t>
+            </a:r>
+            <a:r>
+              <a:rPr lang="en-US" altLang="ko-KR" sz="1500" dirty="0">
+                <a:effectLst>
+                  <a:outerShdw blurRad="38100" dist="38100" dir="2700000" algn="tl">
+                    <a:srgbClr val="000000">
+                      <a:alpha val="43137"/>
+                    </a:srgbClr>
+                  </a:outerShdw>
+                </a:effectLst>
+              </a:rPr>
+              <a:t>: this</a:t>
+            </a:r>
+            <a:r>
+              <a:rPr lang="ko-KR" altLang="en-US" sz="1500" dirty="0">
+                <a:effectLst>
+                  <a:outerShdw blurRad="38100" dist="38100" dir="2700000" algn="tl">
+                    <a:srgbClr val="000000">
+                      <a:alpha val="43137"/>
+                    </a:srgbClr>
+                  </a:outerShdw>
+                </a:effectLst>
+              </a:rPr>
+              <a:t> </a:t>
+            </a:r>
+            <a:r>
+              <a:rPr lang="en-US" altLang="ko-KR" sz="1500" dirty="0">
+                <a:effectLst>
+                  <a:outerShdw blurRad="38100" dist="38100" dir="2700000" algn="tl">
+                    <a:srgbClr val="000000">
+                      <a:alpha val="43137"/>
+                    </a:srgbClr>
+                  </a:outerShdw>
+                </a:effectLst>
+              </a:rPr>
+              <a:t>is</a:t>
+            </a:r>
+            <a:r>
+              <a:rPr lang="ko-KR" altLang="en-US" sz="1500" dirty="0">
+                <a:effectLst>
+                  <a:outerShdw blurRad="38100" dist="38100" dir="2700000" algn="tl">
+                    <a:srgbClr val="000000">
+                      <a:alpha val="43137"/>
+                    </a:srgbClr>
+                  </a:outerShdw>
+                </a:effectLst>
+              </a:rPr>
+              <a:t> </a:t>
+            </a:r>
+            <a:r>
+              <a:rPr lang="en-US" altLang="ko-KR" sz="1500" dirty="0">
+                <a:effectLst>
+                  <a:outerShdw blurRad="38100" dist="38100" dir="2700000" algn="tl">
+                    <a:srgbClr val="000000">
+                      <a:alpha val="43137"/>
+                    </a:srgbClr>
+                  </a:outerShdw>
+                </a:effectLst>
+              </a:rPr>
+              <a:t>palindrome!!</a:t>
+            </a:r>
+          </a:p>
+          <a:p>
+            <a:endParaRPr lang="en-US" altLang="ko-KR" sz="1500" dirty="0">
+              <a:effectLst>
+                <a:outerShdw blurRad="38100" dist="38100" dir="2700000" algn="tl">
+                  <a:srgbClr val="000000">
+                    <a:alpha val="43137"/>
+                  </a:srgbClr>
+                </a:outerShdw>
+              </a:effectLst>
+            </a:endParaRPr>
+          </a:p>
+          <a:p>
+            <a:r>
+              <a:rPr lang="ko-KR" altLang="en-US" sz="1500" b="1" dirty="0">
+                <a:effectLst>
+                  <a:outerShdw blurRad="38100" dist="38100" dir="2700000" algn="tl">
+                    <a:srgbClr val="000000">
+                      <a:alpha val="43137"/>
+                    </a:srgbClr>
+                  </a:outerShdw>
+                </a:effectLst>
+              </a:rPr>
+              <a:t>💻예시 </a:t>
+            </a:r>
+            <a:r>
+              <a:rPr lang="en-US" altLang="ko-KR" sz="1500" b="1" dirty="0">
+                <a:effectLst>
+                  <a:outerShdw blurRad="38100" dist="38100" dir="2700000" algn="tl">
+                    <a:srgbClr val="000000">
+                      <a:alpha val="43137"/>
+                    </a:srgbClr>
+                  </a:outerShdw>
+                </a:effectLst>
+              </a:rPr>
+              <a:t>02</a:t>
+            </a:r>
+          </a:p>
+          <a:p>
+            <a:r>
+              <a:rPr lang="ko-KR" altLang="en-US" sz="1500" dirty="0">
+                <a:effectLst>
+                  <a:outerShdw blurRad="38100" dist="38100" dir="2700000" algn="tl">
+                    <a:srgbClr val="000000">
+                      <a:alpha val="43137"/>
+                    </a:srgbClr>
+                  </a:outerShdw>
+                </a:effectLst>
+              </a:rPr>
+              <a:t>입력 </a:t>
+            </a:r>
+            <a:r>
+              <a:rPr lang="en-US" altLang="ko-KR" sz="1500" dirty="0">
+                <a:effectLst>
+                  <a:outerShdw blurRad="38100" dist="38100" dir="2700000" algn="tl">
+                    <a:srgbClr val="000000">
+                      <a:alpha val="43137"/>
+                    </a:srgbClr>
+                  </a:outerShdw>
+                </a:effectLst>
+              </a:rPr>
+              <a:t>: </a:t>
+            </a:r>
+            <a:r>
+              <a:rPr lang="en-US" altLang="ko-KR" sz="1500" dirty="0" err="1">
+                <a:effectLst>
+                  <a:outerShdw blurRad="38100" dist="38100" dir="2700000" algn="tl">
+                    <a:srgbClr val="000000">
+                      <a:alpha val="43137"/>
+                    </a:srgbClr>
+                  </a:outerShdw>
+                </a:effectLst>
+              </a:rPr>
+              <a:t>raceccr</a:t>
+            </a:r>
+            <a:endParaRPr lang="en-US" altLang="ko-KR" sz="1500" dirty="0">
+              <a:effectLst>
+                <a:outerShdw blurRad="38100" dist="38100" dir="2700000" algn="tl">
+                  <a:srgbClr val="000000">
+                    <a:alpha val="43137"/>
+                  </a:srgbClr>
+                </a:outerShdw>
+              </a:effectLst>
+            </a:endParaRPr>
+          </a:p>
+          <a:p>
+            <a:r>
+              <a:rPr lang="ko-KR" altLang="en-US" sz="1500" dirty="0">
+                <a:effectLst>
+                  <a:outerShdw blurRad="38100" dist="38100" dir="2700000" algn="tl">
+                    <a:srgbClr val="000000">
+                      <a:alpha val="43137"/>
+                    </a:srgbClr>
+                  </a:outerShdw>
+                </a:effectLst>
+              </a:rPr>
+              <a:t>출력 </a:t>
+            </a:r>
+            <a:r>
+              <a:rPr lang="en-US" altLang="ko-KR" sz="1500" dirty="0">
+                <a:effectLst>
+                  <a:outerShdw blurRad="38100" dist="38100" dir="2700000" algn="tl">
+                    <a:srgbClr val="000000">
+                      <a:alpha val="43137"/>
+                    </a:srgbClr>
+                  </a:outerShdw>
+                </a:effectLst>
+              </a:rPr>
+              <a:t>: this</a:t>
+            </a:r>
+            <a:r>
+              <a:rPr lang="ko-KR" altLang="en-US" sz="1500" dirty="0">
+                <a:effectLst>
+                  <a:outerShdw blurRad="38100" dist="38100" dir="2700000" algn="tl">
+                    <a:srgbClr val="000000">
+                      <a:alpha val="43137"/>
+                    </a:srgbClr>
+                  </a:outerShdw>
+                </a:effectLst>
+              </a:rPr>
+              <a:t> </a:t>
+            </a:r>
+            <a:r>
+              <a:rPr lang="en-US" altLang="ko-KR" sz="1500" dirty="0">
+                <a:effectLst>
+                  <a:outerShdw blurRad="38100" dist="38100" dir="2700000" algn="tl">
+                    <a:srgbClr val="000000">
+                      <a:alpha val="43137"/>
+                    </a:srgbClr>
+                  </a:outerShdw>
+                </a:effectLst>
+              </a:rPr>
+              <a:t>is not</a:t>
+            </a:r>
+            <a:r>
+              <a:rPr lang="ko-KR" altLang="en-US" sz="1500" dirty="0">
+                <a:effectLst>
+                  <a:outerShdw blurRad="38100" dist="38100" dir="2700000" algn="tl">
+                    <a:srgbClr val="000000">
+                      <a:alpha val="43137"/>
+                    </a:srgbClr>
+                  </a:outerShdw>
+                </a:effectLst>
+              </a:rPr>
+              <a:t> </a:t>
+            </a:r>
+            <a:r>
+              <a:rPr lang="en-US" altLang="ko-KR" sz="1500" dirty="0">
+                <a:effectLst>
+                  <a:outerShdw blurRad="38100" dist="38100" dir="2700000" algn="tl">
+                    <a:srgbClr val="000000">
+                      <a:alpha val="43137"/>
+                    </a:srgbClr>
+                  </a:outerShdw>
+                </a:effectLst>
+              </a:rPr>
+              <a:t>palindrome...</a:t>
+            </a:r>
+          </a:p>
+          <a:p>
+            <a:endParaRPr lang="en-US" altLang="ko-KR" sz="1500" dirty="0">
+              <a:effectLst>
+                <a:outerShdw blurRad="38100" dist="38100" dir="2700000" algn="tl">
+                  <a:srgbClr val="000000">
+                    <a:alpha val="43137"/>
+                  </a:srgbClr>
+                </a:outerShdw>
+              </a:effectLst>
+            </a:endParaRPr>
+          </a:p>
+        </p:txBody>
+      </p:sp>
+      <p:pic>
+        <p:nvPicPr>
+          <p:cNvPr id="7" name="그림 6">
+            <a:extLst>
+              <a:ext uri="{FF2B5EF4-FFF2-40B4-BE49-F238E27FC236}">
+                <a16:creationId xmlns:a16="http://schemas.microsoft.com/office/drawing/2014/main" id="{9A4711EC-1AE5-40BD-9CC0-664EC436D217}"/>
+              </a:ext>
+            </a:extLst>
+          </p:cNvPr>
+          <p:cNvPicPr>
+            <a:picLocks noChangeAspect="1"/>
+          </p:cNvPicPr>
+          <p:nvPr/>
+        </p:nvPicPr>
+        <p:blipFill>
+          <a:blip r:embed="rId3"/>
+          <a:stretch>
+            <a:fillRect/>
+          </a:stretch>
+        </p:blipFill>
+        <p:spPr>
+          <a:xfrm>
+            <a:off x="6713333" y="3321424"/>
+            <a:ext cx="5079197" cy="1591587"/>
+          </a:xfrm>
+          <a:prstGeom prst="rect">
+            <a:avLst/>
+          </a:prstGeom>
+        </p:spPr>
+      </p:pic>
+      <p:pic>
+        <p:nvPicPr>
+          <p:cNvPr id="9" name="그림 8">
+            <a:extLst>
+              <a:ext uri="{FF2B5EF4-FFF2-40B4-BE49-F238E27FC236}">
+                <a16:creationId xmlns:a16="http://schemas.microsoft.com/office/drawing/2014/main" id="{4998D6F1-C37E-4749-968E-15B1B0791408}"/>
+              </a:ext>
+            </a:extLst>
+          </p:cNvPr>
+          <p:cNvPicPr>
+            <a:picLocks noChangeAspect="1"/>
+          </p:cNvPicPr>
+          <p:nvPr/>
+        </p:nvPicPr>
+        <p:blipFill>
+          <a:blip r:embed="rId4"/>
+          <a:stretch>
+            <a:fillRect/>
+          </a:stretch>
+        </p:blipFill>
+        <p:spPr>
+          <a:xfrm>
+            <a:off x="6713337" y="4930735"/>
+            <a:ext cx="5079196" cy="1448754"/>
+          </a:xfrm>
+          <a:prstGeom prst="rect">
+            <a:avLst/>
+          </a:prstGeom>
+        </p:spPr>
+      </p:pic>
+    </p:spTree>
+    <p:extLst>
+      <p:ext uri="{BB962C8B-B14F-4D97-AF65-F5344CB8AC3E}">
+        <p14:creationId xmlns:p14="http://schemas.microsoft.com/office/powerpoint/2010/main" val="1778783313"/>
+      </p:ext>
+    </p:extLst>
+  </p:cSld>
+  <p:clrMapOvr>
+    <a:masterClrMapping/>
+  </p:clrMapOvr>
+</p:sld>
+</file>
+
 <file path=ppt/slides/slide3.xml><?xml version="1.0" encoding="utf-8"?>
-<p:sld xmlns:a="http://schemas.openxmlformats.org/drawingml/2006/main" xmlns:r="http://schemas.openxmlformats.org/officeDocument/2006/relationships" xmlns:p="http://schemas.openxmlformats.org/presentationml/2006/main">
+<p:sld xmlns:a="http://schemas.openxmlformats.org/drawingml/2006/main" xmlns:r="http://schemas.openxmlformats.org/officeDocument/2006/relationships" xmlns:p="http://schemas.openxmlformats.org/presentationml/2006/main" show="0">
   <p:cSld>
     <p:spTree>
       <p:nvGrpSpPr>
@@ -8994,7 +10110,7 @@
 </file>
 
 <file path=ppt/slides/slide4.xml><?xml version="1.0" encoding="utf-8"?>
-<p:sld xmlns:a="http://schemas.openxmlformats.org/drawingml/2006/main" xmlns:r="http://schemas.openxmlformats.org/officeDocument/2006/relationships" xmlns:p="http://schemas.openxmlformats.org/presentationml/2006/main">
+<p:sld xmlns:a="http://schemas.openxmlformats.org/drawingml/2006/main" xmlns:r="http://schemas.openxmlformats.org/officeDocument/2006/relationships" xmlns:p="http://schemas.openxmlformats.org/presentationml/2006/main" show="0">
   <p:cSld>
     <p:spTree>
       <p:nvGrpSpPr>
@@ -9472,7 +10588,7 @@
 </file>
 
 <file path=ppt/slides/slide5.xml><?xml version="1.0" encoding="utf-8"?>
-<p:sld xmlns:a="http://schemas.openxmlformats.org/drawingml/2006/main" xmlns:r="http://schemas.openxmlformats.org/officeDocument/2006/relationships" xmlns:p="http://schemas.openxmlformats.org/presentationml/2006/main">
+<p:sld xmlns:a="http://schemas.openxmlformats.org/drawingml/2006/main" xmlns:r="http://schemas.openxmlformats.org/officeDocument/2006/relationships" xmlns:p="http://schemas.openxmlformats.org/presentationml/2006/main" show="0">
   <p:cSld>
     <p:spTree>
       <p:nvGrpSpPr>
@@ -9691,7 +10807,7 @@
 </file>
 
 <file path=ppt/slides/slide6.xml><?xml version="1.0" encoding="utf-8"?>
-<p:sld xmlns:a="http://schemas.openxmlformats.org/drawingml/2006/main" xmlns:r="http://schemas.openxmlformats.org/officeDocument/2006/relationships" xmlns:p="http://schemas.openxmlformats.org/presentationml/2006/main">
+<p:sld xmlns:a="http://schemas.openxmlformats.org/drawingml/2006/main" xmlns:r="http://schemas.openxmlformats.org/officeDocument/2006/relationships" xmlns:p="http://schemas.openxmlformats.org/presentationml/2006/main" show="0">
   <p:cSld>
     <p:spTree>
       <p:nvGrpSpPr>
@@ -9910,7 +11026,7 @@
 </file>
 
 <file path=ppt/slides/slide7.xml><?xml version="1.0" encoding="utf-8"?>
-<p:sld xmlns:a="http://schemas.openxmlformats.org/drawingml/2006/main" xmlns:r="http://schemas.openxmlformats.org/officeDocument/2006/relationships" xmlns:p="http://schemas.openxmlformats.org/presentationml/2006/main">
+<p:sld xmlns:a="http://schemas.openxmlformats.org/drawingml/2006/main" xmlns:r="http://schemas.openxmlformats.org/officeDocument/2006/relationships" xmlns:p="http://schemas.openxmlformats.org/presentationml/2006/main" show="0">
   <p:cSld>
     <p:spTree>
       <p:nvGrpSpPr>
@@ -10129,7 +11245,7 @@
 </file>
 
 <file path=ppt/slides/slide8.xml><?xml version="1.0" encoding="utf-8"?>
-<p:sld xmlns:a="http://schemas.openxmlformats.org/drawingml/2006/main" xmlns:r="http://schemas.openxmlformats.org/officeDocument/2006/relationships" xmlns:p="http://schemas.openxmlformats.org/presentationml/2006/main">
+<p:sld xmlns:a="http://schemas.openxmlformats.org/drawingml/2006/main" xmlns:r="http://schemas.openxmlformats.org/officeDocument/2006/relationships" xmlns:p="http://schemas.openxmlformats.org/presentationml/2006/main" show="0">
   <p:cSld>
     <p:spTree>
       <p:nvGrpSpPr>
@@ -10348,7 +11464,7 @@
 </file>
 
 <file path=ppt/slides/slide9.xml><?xml version="1.0" encoding="utf-8"?>
-<p:sld xmlns:a="http://schemas.openxmlformats.org/drawingml/2006/main" xmlns:r="http://schemas.openxmlformats.org/officeDocument/2006/relationships" xmlns:p="http://schemas.openxmlformats.org/presentationml/2006/main">
+<p:sld xmlns:a="http://schemas.openxmlformats.org/drawingml/2006/main" xmlns:r="http://schemas.openxmlformats.org/officeDocument/2006/relationships" xmlns:p="http://schemas.openxmlformats.org/presentationml/2006/main" show="0">
   <p:cSld>
     <p:spTree>
       <p:nvGrpSpPr>

</xml_diff>